<commit_message>
revised presentation by mim
</commit_message>
<xml_diff>
--- a/Proposal/Final/Presentation R1.pptx
+++ b/Proposal/Final/Presentation R1.pptx
@@ -18,8 +18,8 @@
     <p:sldId id="296" r:id="rId9"/>
     <p:sldId id="263" r:id="rId10"/>
     <p:sldId id="297" r:id="rId11"/>
-    <p:sldId id="298" r:id="rId12"/>
-    <p:sldId id="264" r:id="rId13"/>
+    <p:sldId id="264" r:id="rId12"/>
+    <p:sldId id="298" r:id="rId13"/>
     <p:sldId id="299" r:id="rId14"/>
     <p:sldId id="290" r:id="rId15"/>
     <p:sldId id="266" r:id="rId16"/>
@@ -158,8 +158,8 @@
             <p14:sldId id="296"/>
             <p14:sldId id="263"/>
             <p14:sldId id="297"/>
+            <p14:sldId id="264"/>
             <p14:sldId id="298"/>
-            <p14:sldId id="264"/>
             <p14:sldId id="299"/>
             <p14:sldId id="290"/>
             <p14:sldId id="266"/>
@@ -4545,10 +4545,27 @@
               <a:rPr lang="en-US" dirty="0"/>
             </a:br>
             <a:r>
-              <a:rPr lang="th-TH" b="1" dirty="0"/>
-              <a:t>ระบบบริหารจัดการศูนย์ออกกำลังกาย</a:t>
-            </a:r>
-            <a:endParaRPr lang="en-US" dirty="0"/>
+              <a:rPr lang="th-TH" dirty="0" smtClean="0"/>
+              <a:t> </a:t>
+            </a:r>
+            <a:r>
+              <a:rPr lang="th-TH" b="1" dirty="0" smtClean="0">
+                <a:latin typeface="TH Sarabun New" pitchFamily="34" charset="-34"/>
+                <a:cs typeface="TH Sarabun New" pitchFamily="34" charset="-34"/>
+              </a:rPr>
+              <a:t>ระบบ</a:t>
+            </a:r>
+            <a:r>
+              <a:rPr lang="th-TH" b="1" dirty="0">
+                <a:latin typeface="TH Sarabun New" pitchFamily="34" charset="-34"/>
+                <a:cs typeface="TH Sarabun New" pitchFamily="34" charset="-34"/>
+              </a:rPr>
+              <a:t>บริหารจัดการศูนย์ออกกำลังกาย</a:t>
+            </a:r>
+            <a:endParaRPr lang="en-US" dirty="0">
+              <a:latin typeface="TH Sarabun New" pitchFamily="34" charset="-34"/>
+              <a:cs typeface="TH Sarabun New" pitchFamily="34" charset="-34"/>
+            </a:endParaRPr>
           </a:p>
         </p:txBody>
       </p:sp>
@@ -4596,14 +4613,22 @@
         </p:nvSpPr>
         <p:spPr/>
         <p:txBody>
-          <a:bodyPr/>
+          <a:bodyPr>
+            <a:normAutofit/>
+          </a:bodyPr>
           <a:lstStyle/>
           <a:p>
             <a:r>
-              <a:rPr lang="th-TH" dirty="0" smtClean="0"/>
+              <a:rPr lang="th-TH" sz="4000" b="1" dirty="0" smtClean="0">
+                <a:latin typeface="TH Sarabun New" pitchFamily="34" charset="-34"/>
+                <a:cs typeface="TH Sarabun New" pitchFamily="34" charset="-34"/>
+              </a:rPr>
               <a:t>การคำนวณค่าตอบแทนพนักงาน</a:t>
             </a:r>
-            <a:endParaRPr lang="th-TH" dirty="0"/>
+            <a:endParaRPr lang="th-TH" sz="4000" b="1" dirty="0">
+              <a:latin typeface="TH Sarabun New" pitchFamily="34" charset="-34"/>
+              <a:cs typeface="TH Sarabun New" pitchFamily="34" charset="-34"/>
+            </a:endParaRPr>
           </a:p>
         </p:txBody>
       </p:sp>
@@ -4628,7 +4653,7 @@
         </p:blipFill>
         <p:spPr bwMode="auto">
           <a:xfrm>
-            <a:off x="3386464" y="1297353"/>
+            <a:off x="3577850" y="1417638"/>
             <a:ext cx="4206138" cy="4953977"/>
           </a:xfrm>
           <a:prstGeom prst="rect">
@@ -4655,6 +4680,13 @@
   <p:clrMapOvr>
     <a:masterClrMapping/>
   </p:clrMapOvr>
+  <p:timing>
+    <p:tnLst>
+      <p:par>
+        <p:cTn id="1" dur="indefinite" restart="never" nodeType="tmRoot"/>
+      </p:par>
+    </p:tnLst>
+  </p:timing>
 </p:sld>
 </file>
 
@@ -4677,69 +4709,147 @@
       </p:grpSpPr>
       <p:sp>
         <p:nvSpPr>
-          <p:cNvPr id="7" name="ชื่อเรื่อง 6"/>
+          <p:cNvPr id="2" name="ชื่อเรื่อง 1"/>
           <p:cNvSpPr>
             <a:spLocks noGrp="1"/>
           </p:cNvSpPr>
           <p:nvPr>
             <p:ph type="title"/>
+          </p:nvPr>
+        </p:nvSpPr>
+        <p:spPr/>
+        <p:txBody>
+          <a:bodyPr>
+            <a:normAutofit/>
+          </a:bodyPr>
+          <a:lstStyle/>
+          <a:p>
+            <a:r>
+              <a:rPr lang="th-TH" sz="4000" b="1" dirty="0" smtClean="0">
+                <a:latin typeface="TH Sarabun New" pitchFamily="34" charset="-34"/>
+                <a:cs typeface="TH Sarabun New" pitchFamily="34" charset="-34"/>
+              </a:rPr>
+              <a:t>วัตถุประสงค์ในการพัฒนาระบบ</a:t>
+            </a:r>
+            <a:endParaRPr lang="th-TH" sz="4000" b="1" dirty="0">
+              <a:latin typeface="TH Sarabun New" pitchFamily="34" charset="-34"/>
+              <a:cs typeface="TH Sarabun New" pitchFamily="34" charset="-34"/>
+            </a:endParaRPr>
+          </a:p>
+        </p:txBody>
+      </p:sp>
+      <p:sp>
+        <p:nvSpPr>
+          <p:cNvPr id="3" name="Content Placeholder 2"/>
+          <p:cNvSpPr>
+            <a:spLocks noGrp="1"/>
+          </p:cNvSpPr>
+          <p:nvPr>
+            <p:ph idx="1"/>
           </p:nvPr>
         </p:nvSpPr>
         <p:spPr>
           <a:xfrm>
-            <a:off x="2866291" y="4406900"/>
-            <a:ext cx="5628421" cy="1362075"/>
-          </a:xfrm>
-        </p:spPr>
-        <p:txBody>
-          <a:bodyPr/>
+            <a:off x="457200" y="1600201"/>
+            <a:ext cx="8229600" cy="2599660"/>
+          </a:xfrm>
+        </p:spPr>
+        <p:txBody>
+          <a:bodyPr>
+            <a:normAutofit/>
+          </a:bodyPr>
           <a:lstStyle/>
           <a:p>
             <a:r>
+              <a:rPr lang="th-TH" dirty="0">
+                <a:latin typeface="TH Sarabun New" pitchFamily="34" charset="-34"/>
+                <a:cs typeface="TH Sarabun New" pitchFamily="34" charset="-34"/>
+              </a:rPr>
+              <a:t>เพื่อพัฒนาระบบให้มีฟังก์ชันการทำงานที่</a:t>
+            </a:r>
+            <a:r>
               <a:rPr lang="th-TH" dirty="0" smtClean="0">
-                <a:solidFill>
-                  <a:srgbClr val="C00000"/>
-                </a:solidFill>
-              </a:rPr>
-              <a:t>ภาพรวมของระบบใหม่</a:t>
-            </a:r>
+                <a:latin typeface="TH Sarabun New" pitchFamily="34" charset="-34"/>
+                <a:cs typeface="TH Sarabun New" pitchFamily="34" charset="-34"/>
+              </a:rPr>
+              <a:t>เหมาะสม</a:t>
+            </a:r>
+          </a:p>
+          <a:p>
+            <a:r>
+              <a:rPr lang="th-TH" dirty="0" smtClean="0">
+                <a:latin typeface="TH Sarabun New" pitchFamily="34" charset="-34"/>
+                <a:cs typeface="TH Sarabun New" pitchFamily="34" charset="-34"/>
+              </a:rPr>
+              <a:t>เพื่อพัฒนาการสืบค้น</a:t>
+            </a:r>
+            <a:r>
+              <a:rPr lang="th-TH" dirty="0">
+                <a:latin typeface="TH Sarabun New" pitchFamily="34" charset="-34"/>
+                <a:cs typeface="TH Sarabun New" pitchFamily="34" charset="-34"/>
+              </a:rPr>
+              <a:t>ข้อมูล สร้าง และแก้ไข</a:t>
+            </a:r>
+            <a:r>
+              <a:rPr lang="th-TH" dirty="0" smtClean="0">
+                <a:latin typeface="TH Sarabun New" pitchFamily="34" charset="-34"/>
+                <a:cs typeface="TH Sarabun New" pitchFamily="34" charset="-34"/>
+              </a:rPr>
+              <a:t>เอกสารอย่างเป็นระบบ</a:t>
+            </a:r>
+          </a:p>
+          <a:p>
+            <a:r>
+              <a:rPr lang="th-TH" dirty="0" smtClean="0">
+                <a:latin typeface="TH Sarabun New" pitchFamily="34" charset="-34"/>
+                <a:cs typeface="TH Sarabun New" pitchFamily="34" charset="-34"/>
+              </a:rPr>
+              <a:t>เพื่อพัฒนากำหนด</a:t>
+            </a:r>
+            <a:r>
+              <a:rPr lang="th-TH" dirty="0">
+                <a:latin typeface="TH Sarabun New" pitchFamily="34" charset="-34"/>
+                <a:cs typeface="TH Sarabun New" pitchFamily="34" charset="-34"/>
+              </a:rPr>
+              <a:t>เป้าหมายในการปฏิบัติงานของพนักงานแต่ละ</a:t>
+            </a:r>
+            <a:r>
+              <a:rPr lang="th-TH" dirty="0" smtClean="0">
+                <a:latin typeface="TH Sarabun New" pitchFamily="34" charset="-34"/>
+                <a:cs typeface="TH Sarabun New" pitchFamily="34" charset="-34"/>
+              </a:rPr>
+              <a:t>ฝ่ายผ่านระบบได้</a:t>
+            </a:r>
+            <a:endParaRPr lang="en-US" dirty="0">
+              <a:latin typeface="TH Sarabun New" pitchFamily="34" charset="-34"/>
+              <a:cs typeface="TH Sarabun New" pitchFamily="34" charset="-34"/>
+            </a:endParaRPr>
+          </a:p>
+          <a:p>
             <a:endParaRPr lang="th-TH" dirty="0">
-              <a:solidFill>
-                <a:srgbClr val="C00000"/>
-              </a:solidFill>
+              <a:latin typeface="TH Sarabun New" pitchFamily="34" charset="-34"/>
+              <a:cs typeface="TH Sarabun New" pitchFamily="34" charset="-34"/>
             </a:endParaRPr>
-          </a:p>
-        </p:txBody>
-      </p:sp>
-      <p:sp>
-        <p:nvSpPr>
-          <p:cNvPr id="8" name="ตัวแทนข้อความ 7"/>
-          <p:cNvSpPr>
-            <a:spLocks noGrp="1"/>
-          </p:cNvSpPr>
-          <p:nvPr>
-            <p:ph type="body" idx="1"/>
-          </p:nvPr>
-        </p:nvSpPr>
-        <p:spPr/>
-        <p:txBody>
-          <a:bodyPr/>
-          <a:lstStyle/>
-          <a:p>
-            <a:endParaRPr lang="th-TH"/>
           </a:p>
         </p:txBody>
       </p:sp>
     </p:spTree>
     <p:extLst>
       <p:ext uri="{BB962C8B-B14F-4D97-AF65-F5344CB8AC3E}">
-        <p14:creationId xmlns:p14="http://schemas.microsoft.com/office/powerpoint/2010/main" val="102299389"/>
+        <p14:creationId xmlns:p14="http://schemas.microsoft.com/office/powerpoint/2010/main" val="3628872196"/>
       </p:ext>
     </p:extLst>
   </p:cSld>
   <p:clrMapOvr>
     <a:masterClrMapping/>
   </p:clrMapOvr>
+  <p:timing>
+    <p:tnLst>
+      <p:par>
+        <p:cTn id="1" dur="indefinite" restart="never" nodeType="tmRoot"/>
+      </p:par>
+    </p:tnLst>
+  </p:timing>
 </p:sld>
 </file>
 
@@ -4762,12 +4872,55 @@
       </p:grpSpPr>
       <p:sp>
         <p:nvSpPr>
-          <p:cNvPr id="2" name="ชื่อเรื่อง 1"/>
+          <p:cNvPr id="7" name="ชื่อเรื่อง 6"/>
           <p:cNvSpPr>
             <a:spLocks noGrp="1"/>
           </p:cNvSpPr>
           <p:nvPr>
             <p:ph type="title"/>
+          </p:nvPr>
+        </p:nvSpPr>
+        <p:spPr>
+          <a:xfrm>
+            <a:off x="2866291" y="4406900"/>
+            <a:ext cx="5628421" cy="1362075"/>
+          </a:xfrm>
+        </p:spPr>
+        <p:txBody>
+          <a:bodyPr>
+            <a:normAutofit/>
+          </a:bodyPr>
+          <a:lstStyle/>
+          <a:p>
+            <a:pPr algn="ctr"/>
+            <a:r>
+              <a:rPr lang="th-TH" sz="4400" dirty="0" smtClean="0">
+                <a:solidFill>
+                  <a:srgbClr val="C00000"/>
+                </a:solidFill>
+                <a:latin typeface="TH Sarabun New" pitchFamily="34" charset="-34"/>
+                <a:cs typeface="TH Sarabun New" pitchFamily="34" charset="-34"/>
+              </a:rPr>
+              <a:t>ภาพรวมของระบบใหม่</a:t>
+            </a:r>
+            <a:endParaRPr lang="th-TH" sz="4400" dirty="0">
+              <a:solidFill>
+                <a:srgbClr val="C00000"/>
+              </a:solidFill>
+              <a:latin typeface="TH Sarabun New" pitchFamily="34" charset="-34"/>
+              <a:cs typeface="TH Sarabun New" pitchFamily="34" charset="-34"/>
+            </a:endParaRPr>
+          </a:p>
+        </p:txBody>
+      </p:sp>
+      <p:sp>
+        <p:nvSpPr>
+          <p:cNvPr id="8" name="ตัวแทนข้อความ 7"/>
+          <p:cNvSpPr>
+            <a:spLocks noGrp="1"/>
+          </p:cNvSpPr>
+          <p:nvPr>
+            <p:ph type="body" idx="1"/>
           </p:nvPr>
         </p:nvSpPr>
         <p:spPr/>
@@ -4775,81 +4928,14 @@
           <a:bodyPr/>
           <a:lstStyle/>
           <a:p>
-            <a:r>
-              <a:rPr lang="th-TH" dirty="0" smtClean="0"/>
-              <a:t>วัตถุประสงค์ในการพัฒนาระบบ</a:t>
-            </a:r>
-            <a:endParaRPr lang="th-TH" dirty="0"/>
-          </a:p>
-        </p:txBody>
-      </p:sp>
-      <p:sp>
-        <p:nvSpPr>
-          <p:cNvPr id="3" name="Content Placeholder 2"/>
-          <p:cNvSpPr>
-            <a:spLocks noGrp="1"/>
-          </p:cNvSpPr>
-          <p:nvPr>
-            <p:ph idx="1"/>
-          </p:nvPr>
-        </p:nvSpPr>
-        <p:spPr/>
-        <p:txBody>
-          <a:bodyPr/>
-          <a:lstStyle/>
-          <a:p>
-            <a:r>
-              <a:rPr lang="th-TH" dirty="0"/>
-              <a:t>เพื่อพัฒนาระบบให้มีฟังก์ชันการทำงานที่</a:t>
-            </a:r>
-            <a:r>
-              <a:rPr lang="th-TH" dirty="0" smtClean="0"/>
-              <a:t>เหมาะสม</a:t>
-            </a:r>
-          </a:p>
-          <a:p>
-            <a:r>
-              <a:rPr lang="th-TH" dirty="0" smtClean="0"/>
-              <a:t>เพื่อพัฒนาการ</a:t>
-            </a:r>
-            <a:r>
-              <a:rPr lang="th-TH" dirty="0" smtClean="0"/>
-              <a:t>สืบค้น</a:t>
-            </a:r>
-            <a:r>
-              <a:rPr lang="th-TH" dirty="0"/>
-              <a:t>ข้อมูล สร้าง และแก้ไข</a:t>
-            </a:r>
-            <a:r>
-              <a:rPr lang="th-TH" dirty="0" smtClean="0"/>
-              <a:t>เอกสารอย่างเป็นระบบ</a:t>
-            </a:r>
-            <a:endParaRPr lang="th-TH" dirty="0" smtClean="0"/>
-          </a:p>
-          <a:p>
-            <a:r>
-              <a:rPr lang="th-TH" dirty="0" smtClean="0"/>
-              <a:t>เพื่อพัฒนากำหนด</a:t>
-            </a:r>
-            <a:r>
-              <a:rPr lang="th-TH" dirty="0"/>
-              <a:t>เป้าหมายในการปฏิบัติงานของพนักงานแต่ละ</a:t>
-            </a:r>
-            <a:r>
-              <a:rPr lang="th-TH" dirty="0" smtClean="0"/>
-              <a:t>ฝ่ายผ่านระบบได้</a:t>
-            </a:r>
-            <a:endParaRPr lang="en-US" dirty="0"/>
-          </a:p>
-          <a:p>
-            <a:endParaRPr lang="th-TH" dirty="0"/>
+            <a:endParaRPr lang="th-TH"/>
           </a:p>
         </p:txBody>
       </p:sp>
     </p:spTree>
     <p:extLst>
       <p:ext uri="{BB962C8B-B14F-4D97-AF65-F5344CB8AC3E}">
-        <p14:creationId xmlns:p14="http://schemas.microsoft.com/office/powerpoint/2010/main" val="3628872196"/>
+        <p14:creationId xmlns:p14="http://schemas.microsoft.com/office/powerpoint/2010/main" val="102299389"/>
       </p:ext>
     </p:extLst>
   </p:cSld>
@@ -4901,10 +4987,16 @@
           <a:lstStyle/>
           <a:p>
             <a:r>
-              <a:rPr lang="th-TH" dirty="0" smtClean="0"/>
+              <a:rPr lang="th-TH" sz="4000" b="1" dirty="0" smtClean="0">
+                <a:latin typeface="TH Sarabun New" pitchFamily="34" charset="-34"/>
+                <a:cs typeface="TH Sarabun New" pitchFamily="34" charset="-34"/>
+              </a:rPr>
               <a:t>โครงสร้างระบบใหม่ (ภาพรวม)</a:t>
             </a:r>
-            <a:endParaRPr lang="th-TH" dirty="0"/>
+            <a:endParaRPr lang="th-TH" sz="4000" b="1" dirty="0">
+              <a:latin typeface="TH Sarabun New" pitchFamily="34" charset="-34"/>
+              <a:cs typeface="TH Sarabun New" pitchFamily="34" charset="-34"/>
+            </a:endParaRPr>
           </a:p>
         </p:txBody>
       </p:sp>
@@ -4928,7 +5020,7 @@
         </p:blipFill>
         <p:spPr>
           <a:xfrm>
-            <a:off x="352718" y="2067388"/>
+            <a:off x="457200" y="1759043"/>
             <a:ext cx="8391232" cy="3810269"/>
           </a:xfrm>
           <a:prstGeom prst="rect">
@@ -4936,8 +5028,9 @@
           </a:prstGeom>
           <a:ln w="3175">
             <a:solidFill>
-              <a:schemeClr val="bg1">
-                <a:lumMod val="75000"/>
+              <a:schemeClr val="tx1">
+                <a:lumMod val="50000"/>
+                <a:lumOff val="50000"/>
               </a:schemeClr>
             </a:solidFill>
           </a:ln>
@@ -4992,7 +5085,7 @@
         </p:nvSpPr>
         <p:spPr>
           <a:xfrm>
-            <a:off x="444840" y="891354"/>
+            <a:off x="444840" y="997684"/>
             <a:ext cx="7421153" cy="862834"/>
           </a:xfrm>
         </p:spPr>
@@ -5003,32 +5096,49 @@
           <a:lstStyle/>
           <a:p>
             <a:r>
-              <a:rPr lang="th-TH" dirty="0"/>
+              <a:rPr lang="th-TH" b="1" dirty="0">
+                <a:latin typeface="TH Sarabun New" pitchFamily="34" charset="-34"/>
+                <a:cs typeface="TH Sarabun New" pitchFamily="34" charset="-34"/>
+              </a:rPr>
               <a:t>ระบบตรวจสอบสิทธิ์ผู้เข้าใช้</a:t>
             </a:r>
             <a:r>
-              <a:rPr lang="th-TH" dirty="0" smtClean="0"/>
+              <a:rPr lang="th-TH" b="1" dirty="0" smtClean="0">
+                <a:latin typeface="TH Sarabun New" pitchFamily="34" charset="-34"/>
+                <a:cs typeface="TH Sarabun New" pitchFamily="34" charset="-34"/>
+              </a:rPr>
               <a:t>ระบบ</a:t>
             </a:r>
             <a:br>
-              <a:rPr lang="th-TH" dirty="0" smtClean="0"/>
+              <a:rPr lang="th-TH" b="1" dirty="0" smtClean="0">
+                <a:latin typeface="TH Sarabun New" pitchFamily="34" charset="-34"/>
+                <a:cs typeface="TH Sarabun New" pitchFamily="34" charset="-34"/>
+              </a:rPr>
             </a:br>
             <a:r>
-              <a:rPr lang="th-TH" dirty="0" smtClean="0"/>
+              <a:rPr lang="th-TH" b="1" dirty="0" smtClean="0">
+                <a:latin typeface="TH Sarabun New" pitchFamily="34" charset="-34"/>
+                <a:cs typeface="TH Sarabun New" pitchFamily="34" charset="-34"/>
+              </a:rPr>
               <a:t> </a:t>
             </a:r>
             <a:r>
-              <a:rPr lang="en-US" dirty="0"/>
+              <a:rPr lang="en-US" b="1" dirty="0">
+                <a:latin typeface="TH Sarabun New" pitchFamily="34" charset="-34"/>
+                <a:cs typeface="TH Sarabun New" pitchFamily="34" charset="-34"/>
+              </a:rPr>
               <a:t>(User Authentication) </a:t>
             </a:r>
-            <a:r>
-              <a:rPr lang="en-US" b="1" dirty="0"/>
-              <a:t/>
-            </a:r>
             <a:br>
-              <a:rPr lang="en-US" b="1" dirty="0"/>
+              <a:rPr lang="en-US" b="1" dirty="0">
+                <a:latin typeface="TH Sarabun New" pitchFamily="34" charset="-34"/>
+                <a:cs typeface="TH Sarabun New" pitchFamily="34" charset="-34"/>
+              </a:rPr>
             </a:br>
-            <a:endParaRPr lang="th-TH" dirty="0"/>
+            <a:endParaRPr lang="th-TH" b="1" dirty="0">
+              <a:latin typeface="TH Sarabun New" pitchFamily="34" charset="-34"/>
+              <a:cs typeface="TH Sarabun New" pitchFamily="34" charset="-34"/>
+            </a:endParaRPr>
           </a:p>
         </p:txBody>
       </p:sp>
@@ -5044,8 +5154,8 @@
         </p:nvSpPr>
         <p:spPr>
           <a:xfrm>
-            <a:off x="2755900" y="1930400"/>
-            <a:ext cx="5930900" cy="4195763"/>
+            <a:off x="1711841" y="1930400"/>
+            <a:ext cx="7070651" cy="4195763"/>
           </a:xfrm>
         </p:spPr>
         <p:txBody>
@@ -5058,19 +5168,38 @@
               <a:buNone/>
             </a:pPr>
             <a:r>
-              <a:rPr lang="th-TH" sz="2500" dirty="0" smtClean="0"/>
+              <a:rPr lang="th-TH" sz="2500" dirty="0" smtClean="0">
+                <a:latin typeface="TH Sarabun New" pitchFamily="34" charset="-34"/>
+                <a:cs typeface="TH Sarabun New" pitchFamily="34" charset="-34"/>
+              </a:rPr>
+              <a:t>	</a:t>
+            </a:r>
+            <a:r>
+              <a:rPr lang="th-TH" dirty="0" smtClean="0">
+                <a:latin typeface="TH Sarabun New" pitchFamily="34" charset="-34"/>
+                <a:cs typeface="TH Sarabun New" pitchFamily="34" charset="-34"/>
+              </a:rPr>
               <a:t>เป็น</a:t>
             </a:r>
             <a:r>
-              <a:rPr lang="th-TH" sz="2500" dirty="0"/>
+              <a:rPr lang="th-TH" dirty="0">
+                <a:latin typeface="TH Sarabun New" pitchFamily="34" charset="-34"/>
+                <a:cs typeface="TH Sarabun New" pitchFamily="34" charset="-34"/>
+              </a:rPr>
               <a:t>ส่วนที่ใช้แบ่งสิทธิ์การเข้าใช้ระบบโดยจะแบ่งตามหน้าที่ของผู้ใช้งานระบบ ซึ่ง</a:t>
             </a:r>
             <a:r>
-              <a:rPr lang="th-TH" sz="2500" dirty="0" smtClean="0"/>
+              <a:rPr lang="th-TH" dirty="0" smtClean="0">
+                <a:latin typeface="TH Sarabun New" pitchFamily="34" charset="-34"/>
+                <a:cs typeface="TH Sarabun New" pitchFamily="34" charset="-34"/>
+              </a:rPr>
               <a:t>ในแต่ละผู้ใช้</a:t>
             </a:r>
             <a:r>
-              <a:rPr lang="th-TH" sz="2500" dirty="0"/>
+              <a:rPr lang="th-TH" dirty="0">
+                <a:latin typeface="TH Sarabun New" pitchFamily="34" charset="-34"/>
+                <a:cs typeface="TH Sarabun New" pitchFamily="34" charset="-34"/>
+              </a:rPr>
               <a:t>ระบบจะมีสิทธิ์ที่แตกต่างกัน </a:t>
             </a:r>
           </a:p>
@@ -5079,10 +5208,16 @@
               <a:buNone/>
             </a:pPr>
             <a:r>
-              <a:rPr lang="th-TH" sz="2500" dirty="0" smtClean="0"/>
+              <a:rPr lang="th-TH" sz="2500" dirty="0" smtClean="0">
+                <a:latin typeface="TH Sarabun New" pitchFamily="34" charset="-34"/>
+                <a:cs typeface="TH Sarabun New" pitchFamily="34" charset="-34"/>
+              </a:rPr>
               <a:t>	</a:t>
             </a:r>
-            <a:endParaRPr lang="th-TH" sz="2500" dirty="0"/>
+            <a:endParaRPr lang="th-TH" sz="2500" dirty="0">
+              <a:latin typeface="TH Sarabun New" pitchFamily="34" charset="-34"/>
+              <a:cs typeface="TH Sarabun New" pitchFamily="34" charset="-34"/>
+            </a:endParaRPr>
           </a:p>
         </p:txBody>
       </p:sp>
@@ -5094,7 +5229,7 @@
         </p:nvSpPr>
         <p:spPr>
           <a:xfrm>
-            <a:off x="4438327" y="4227443"/>
+            <a:off x="4438327" y="3887187"/>
             <a:ext cx="2346785" cy="980661"/>
           </a:xfrm>
           <a:prstGeom prst="ellipse">
@@ -5121,10 +5256,16 @@
           <a:p>
             <a:pPr algn="ctr"/>
             <a:r>
-              <a:rPr lang="th-TH" sz="2400" dirty="0" smtClean="0"/>
+              <a:rPr lang="th-TH" sz="2400" b="1" dirty="0" smtClean="0">
+                <a:latin typeface="TH Sarabun New" pitchFamily="34" charset="-34"/>
+                <a:cs typeface="TH Sarabun New" pitchFamily="34" charset="-34"/>
+              </a:rPr>
               <a:t>ระบบตรวจสอบสิทธ์ผู้เข้าใช้ระบบ</a:t>
             </a:r>
-            <a:endParaRPr lang="th-TH" sz="2400" dirty="0"/>
+            <a:endParaRPr lang="th-TH" sz="2400" b="1" dirty="0">
+              <a:latin typeface="TH Sarabun New" pitchFamily="34" charset="-34"/>
+              <a:cs typeface="TH Sarabun New" pitchFamily="34" charset="-34"/>
+            </a:endParaRPr>
           </a:p>
         </p:txBody>
       </p:sp>
@@ -5151,7 +5292,7 @@
         </p:blipFill>
         <p:spPr bwMode="auto">
           <a:xfrm>
-            <a:off x="3159815" y="3429000"/>
+            <a:off x="3159815" y="3088744"/>
             <a:ext cx="571500" cy="752475"/>
           </a:xfrm>
           <a:prstGeom prst="rect">
@@ -5215,7 +5356,7 @@
         </p:blipFill>
         <p:spPr bwMode="auto">
           <a:xfrm>
-            <a:off x="7580243" y="3428999"/>
+            <a:off x="7580243" y="3088743"/>
             <a:ext cx="571500" cy="752475"/>
           </a:xfrm>
           <a:prstGeom prst="rect">
@@ -5279,7 +5420,7 @@
         </p:blipFill>
         <p:spPr bwMode="auto">
           <a:xfrm>
-            <a:off x="3159815" y="5373688"/>
+            <a:off x="3159815" y="5033432"/>
             <a:ext cx="571500" cy="752475"/>
           </a:xfrm>
           <a:prstGeom prst="rect">
@@ -5343,7 +5484,7 @@
         </p:blipFill>
         <p:spPr bwMode="auto">
           <a:xfrm>
-            <a:off x="7633252" y="5373688"/>
+            <a:off x="7633252" y="5033432"/>
             <a:ext cx="571500" cy="752475"/>
           </a:xfrm>
           <a:prstGeom prst="rect">
@@ -5392,7 +5533,7 @@
         </p:nvCxnSpPr>
         <p:spPr>
           <a:xfrm>
-            <a:off x="3837332" y="4028661"/>
+            <a:off x="3837332" y="3688405"/>
             <a:ext cx="707013" cy="450574"/>
           </a:xfrm>
           <a:prstGeom prst="straightConnector1">
@@ -5425,7 +5566,7 @@
         </p:nvCxnSpPr>
         <p:spPr>
           <a:xfrm flipH="1">
-            <a:off x="6785112" y="4028661"/>
+            <a:off x="6785112" y="3688405"/>
             <a:ext cx="795131" cy="450574"/>
           </a:xfrm>
           <a:prstGeom prst="straightConnector1">
@@ -5458,7 +5599,7 @@
         </p:nvCxnSpPr>
         <p:spPr>
           <a:xfrm flipH="1" flipV="1">
-            <a:off x="6732103" y="5010012"/>
+            <a:off x="6732103" y="4669756"/>
             <a:ext cx="848140" cy="727352"/>
           </a:xfrm>
           <a:prstGeom prst="straightConnector1">
@@ -5491,7 +5632,7 @@
         </p:nvCxnSpPr>
         <p:spPr>
           <a:xfrm flipV="1">
-            <a:off x="3731315" y="5010012"/>
+            <a:off x="3731315" y="4669756"/>
             <a:ext cx="813030" cy="489640"/>
           </a:xfrm>
           <a:prstGeom prst="straightConnector1">
@@ -5524,7 +5665,7 @@
         </p:nvSpPr>
         <p:spPr>
           <a:xfrm>
-            <a:off x="2615049" y="4227443"/>
+            <a:off x="2615049" y="3887187"/>
             <a:ext cx="1661032" cy="707886"/>
           </a:xfrm>
           <a:prstGeom prst="rect">
@@ -5539,12 +5680,18 @@
           <a:lstStyle/>
           <a:p>
             <a:r>
-              <a:rPr lang="th-TH" sz="2000" dirty="0"/>
+              <a:rPr lang="th-TH" sz="2000" dirty="0">
+                <a:latin typeface="TH Sarabun New" pitchFamily="34" charset="-34"/>
+                <a:cs typeface="TH Sarabun New" pitchFamily="34" charset="-34"/>
+              </a:rPr>
               <a:t>พนักงานบริการลูกค้า</a:t>
             </a:r>
           </a:p>
           <a:p>
-            <a:endParaRPr lang="th-TH" sz="2000" dirty="0"/>
+            <a:endParaRPr lang="th-TH" sz="2000" dirty="0">
+              <a:latin typeface="TH Sarabun New" pitchFamily="34" charset="-34"/>
+              <a:cs typeface="TH Sarabun New" pitchFamily="34" charset="-34"/>
+            </a:endParaRPr>
           </a:p>
         </p:txBody>
       </p:sp>
@@ -5556,7 +5703,7 @@
         </p:nvSpPr>
         <p:spPr>
           <a:xfrm>
-            <a:off x="7336951" y="4267200"/>
+            <a:off x="7336951" y="3926944"/>
             <a:ext cx="1164101" cy="677108"/>
           </a:xfrm>
           <a:prstGeom prst="rect">
@@ -5571,8 +5718,15 @@
           <a:lstStyle/>
           <a:p>
             <a:r>
+              <a:rPr lang="th-TH" sz="2000" dirty="0">
+                <a:latin typeface="TH Sarabun New" pitchFamily="34" charset="-34"/>
+                <a:cs typeface="TH Sarabun New" pitchFamily="34" charset="-34"/>
+              </a:rPr>
+              <a:t>พนักงาน</a:t>
+            </a:r>
+            <a:r>
               <a:rPr lang="th-TH" sz="2000" dirty="0"/>
-              <a:t>พนักงานบัญชี</a:t>
+              <a:t>บัญชี</a:t>
             </a:r>
           </a:p>
           <a:p>
@@ -5588,8 +5742,8 @@
         </p:nvSpPr>
         <p:spPr>
           <a:xfrm>
-            <a:off x="2408824" y="6126163"/>
-            <a:ext cx="2135521" cy="677108"/>
+            <a:off x="2706548" y="5785907"/>
+            <a:ext cx="1460656" cy="707886"/>
           </a:xfrm>
           <a:prstGeom prst="rect">
             <a:avLst/>
@@ -5600,11 +5754,25 @@
           <a:bodyPr wrap="none" rtlCol="0">
             <a:spAutoFit/>
           </a:bodyPr>
-          <a:lstStyle/>
-          <a:p>
-            <a:r>
-              <a:rPr lang="th-TH" sz="2000" dirty="0"/>
-              <a:t>พนักงานผู้ช่วยฝึกส่วนบุคคล</a:t>
+          <a:lstStyle>
+            <a:defPPr>
+              <a:defRPr lang="en-US"/>
+            </a:defPPr>
+            <a:lvl1pPr>
+              <a:defRPr sz="2000">
+                <a:latin typeface="TH Sarabun New" pitchFamily="34" charset="-34"/>
+                <a:cs typeface="TH Sarabun New" pitchFamily="34" charset="-34"/>
+              </a:defRPr>
+            </a:lvl1pPr>
+          </a:lstStyle>
+          <a:p>
+            <a:r>
+              <a:rPr lang="th-TH" dirty="0"/>
+              <a:t>ผู้ช่วย</a:t>
+            </a:r>
+            <a:r>
+              <a:rPr lang="th-TH" dirty="0"/>
+              <a:t>ฝึกส่วนบุคคล</a:t>
             </a:r>
           </a:p>
           <a:p>
@@ -5620,7 +5788,7 @@
         </p:nvSpPr>
         <p:spPr>
           <a:xfrm>
-            <a:off x="7580244" y="6228522"/>
+            <a:off x="7601510" y="5792569"/>
             <a:ext cx="750636" cy="677108"/>
           </a:xfrm>
           <a:prstGeom prst="rect">
@@ -5635,7 +5803,10 @@
           <a:lstStyle/>
           <a:p>
             <a:r>
-              <a:rPr lang="th-TH" sz="2000" dirty="0"/>
+              <a:rPr lang="th-TH" sz="2000" dirty="0">
+                <a:latin typeface="TH Sarabun New" pitchFamily="34" charset="-34"/>
+                <a:cs typeface="TH Sarabun New" pitchFamily="34" charset="-34"/>
+              </a:rPr>
               <a:t>ผู้บริหาร</a:t>
             </a:r>
           </a:p>
@@ -5694,19 +5865,28 @@
         <p:spPr/>
         <p:txBody>
           <a:bodyPr>
-            <a:normAutofit fontScale="90000"/>
+            <a:normAutofit/>
           </a:bodyPr>
           <a:lstStyle/>
           <a:p>
             <a:r>
-              <a:rPr lang="th-TH" dirty="0"/>
+              <a:rPr lang="th-TH" sz="4000" b="1" dirty="0">
+                <a:latin typeface="TH Sarabun New" pitchFamily="34" charset="-34"/>
+                <a:cs typeface="TH Sarabun New" pitchFamily="34" charset="-34"/>
+              </a:rPr>
               <a:t>ระบบจัดการสมาชิก </a:t>
             </a:r>
             <a:r>
-              <a:rPr lang="en-US" dirty="0"/>
+              <a:rPr lang="en-US" sz="4000" b="1" dirty="0">
+                <a:latin typeface="TH Sarabun New" pitchFamily="34" charset="-34"/>
+                <a:cs typeface="TH Sarabun New" pitchFamily="34" charset="-34"/>
+              </a:rPr>
               <a:t>(Member Profile) </a:t>
             </a:r>
-            <a:endParaRPr lang="th-TH" dirty="0"/>
+            <a:endParaRPr lang="th-TH" sz="4000" b="1" dirty="0">
+              <a:latin typeface="TH Sarabun New" pitchFamily="34" charset="-34"/>
+              <a:cs typeface="TH Sarabun New" pitchFamily="34" charset="-34"/>
+            </a:endParaRPr>
           </a:p>
         </p:txBody>
       </p:sp>
@@ -5731,62 +5911,99 @@
               <a:buNone/>
             </a:pPr>
             <a:r>
-              <a:rPr lang="th-TH" sz="2500" dirty="0" smtClean="0"/>
-              <a:t>เป็น</a:t>
-            </a:r>
-            <a:r>
-              <a:rPr lang="th-TH" sz="2500" dirty="0"/>
+              <a:rPr lang="th-TH" dirty="0" smtClean="0">
+                <a:latin typeface="TH Sarabun New" pitchFamily="34" charset="-34"/>
+                <a:cs typeface="TH Sarabun New" pitchFamily="34" charset="-34"/>
+              </a:rPr>
+              <a:t>	เป็น</a:t>
+            </a:r>
+            <a:r>
+              <a:rPr lang="th-TH" dirty="0">
+                <a:latin typeface="TH Sarabun New" pitchFamily="34" charset="-34"/>
+                <a:cs typeface="TH Sarabun New" pitchFamily="34" charset="-34"/>
+              </a:rPr>
               <a:t>ส่วนสำหรับพนักงานบริการลูกค้า ใช้ในการจัดการรายละเอียดข้อมูลของสมาชิกที่เข้ามาใช้บริการ ซึ่งจะมีฟังก์ชันการทำงานภายในระบบจัดการสมาชิก </a:t>
             </a:r>
             <a:r>
-              <a:rPr lang="th-TH" sz="2500" dirty="0" smtClean="0"/>
+              <a:rPr lang="th-TH" dirty="0" smtClean="0">
+                <a:latin typeface="TH Sarabun New" pitchFamily="34" charset="-34"/>
+                <a:cs typeface="TH Sarabun New" pitchFamily="34" charset="-34"/>
+              </a:rPr>
               <a:t>	</a:t>
             </a:r>
-            <a:endParaRPr lang="th-TH" sz="2500" dirty="0" smtClean="0"/>
-          </a:p>
-          <a:p>
-            <a:r>
-              <a:rPr lang="th-TH" sz="2500" dirty="0" smtClean="0"/>
+          </a:p>
+          <a:p>
+            <a:r>
+              <a:rPr lang="th-TH" dirty="0" smtClean="0">
+                <a:latin typeface="TH Sarabun New" pitchFamily="34" charset="-34"/>
+                <a:cs typeface="TH Sarabun New" pitchFamily="34" charset="-34"/>
+              </a:rPr>
               <a:t>สามารถ</a:t>
             </a:r>
             <a:r>
-              <a:rPr lang="th-TH" sz="2500" dirty="0"/>
+              <a:rPr lang="th-TH" dirty="0">
+                <a:latin typeface="TH Sarabun New" pitchFamily="34" charset="-34"/>
+                <a:cs typeface="TH Sarabun New" pitchFamily="34" charset="-34"/>
+              </a:rPr>
               <a:t>เพิ่ม ลบ แก้ไข และค้นหาสมาชิก</a:t>
             </a:r>
             <a:r>
-              <a:rPr lang="th-TH" sz="2500" dirty="0" smtClean="0"/>
+              <a:rPr lang="th-TH" dirty="0" smtClean="0">
+                <a:latin typeface="TH Sarabun New" pitchFamily="34" charset="-34"/>
+                <a:cs typeface="TH Sarabun New" pitchFamily="34" charset="-34"/>
+              </a:rPr>
               <a:t>ได้	</a:t>
             </a:r>
-            <a:endParaRPr lang="th-TH" sz="2500" dirty="0" smtClean="0"/>
-          </a:p>
-          <a:p>
-            <a:r>
-              <a:rPr lang="th-TH" sz="2500" dirty="0" smtClean="0"/>
+          </a:p>
+          <a:p>
+            <a:r>
+              <a:rPr lang="th-TH" dirty="0" smtClean="0">
+                <a:latin typeface="TH Sarabun New" pitchFamily="34" charset="-34"/>
+                <a:cs typeface="TH Sarabun New" pitchFamily="34" charset="-34"/>
+              </a:rPr>
               <a:t>สามารถ</a:t>
             </a:r>
             <a:r>
-              <a:rPr lang="th-TH" sz="2500" dirty="0"/>
+              <a:rPr lang="th-TH" dirty="0">
+                <a:latin typeface="TH Sarabun New" pitchFamily="34" charset="-34"/>
+                <a:cs typeface="TH Sarabun New" pitchFamily="34" charset="-34"/>
+              </a:rPr>
               <a:t>จัดเก็บทะเบียนสมาชิก รายละเอียดประกอบไปด้วย ประเภท</a:t>
             </a:r>
             <a:r>
-              <a:rPr lang="th-TH" sz="2500" dirty="0" smtClean="0"/>
+              <a:rPr lang="th-TH" dirty="0" smtClean="0">
+                <a:latin typeface="TH Sarabun New" pitchFamily="34" charset="-34"/>
+                <a:cs typeface="TH Sarabun New" pitchFamily="34" charset="-34"/>
+              </a:rPr>
               <a:t>ของสมาชิก </a:t>
             </a:r>
             <a:r>
-              <a:rPr lang="th-TH" sz="2500" dirty="0"/>
+              <a:rPr lang="th-TH" dirty="0">
+                <a:latin typeface="TH Sarabun New" pitchFamily="34" charset="-34"/>
+                <a:cs typeface="TH Sarabun New" pitchFamily="34" charset="-34"/>
+              </a:rPr>
               <a:t>วันเริ่มต้นเข้าใช้บริการ วันหมดอายุของสมาชิก และรายละเอียด</a:t>
             </a:r>
             <a:r>
-              <a:rPr lang="th-TH" sz="2500" dirty="0" smtClean="0"/>
+              <a:rPr lang="th-TH" dirty="0" smtClean="0">
+                <a:latin typeface="TH Sarabun New" pitchFamily="34" charset="-34"/>
+                <a:cs typeface="TH Sarabun New" pitchFamily="34" charset="-34"/>
+              </a:rPr>
               <a:t>การ	เข้าใช้บริการต่างๆ</a:t>
             </a:r>
-            <a:endParaRPr lang="th-TH" sz="2500" dirty="0"/>
+            <a:endParaRPr lang="th-TH" dirty="0">
+              <a:latin typeface="TH Sarabun New" pitchFamily="34" charset="-34"/>
+              <a:cs typeface="TH Sarabun New" pitchFamily="34" charset="-34"/>
+            </a:endParaRPr>
           </a:p>
           <a:p>
             <a:pPr marL="457200" indent="-457200">
               <a:buAutoNum type="arabicPeriod" startAt="2"/>
             </a:pPr>
-            <a:endParaRPr lang="th-TH" sz="2500" b="1" dirty="0"/>
+            <a:endParaRPr lang="th-TH" dirty="0">
+              <a:latin typeface="TH Sarabun New" pitchFamily="34" charset="-34"/>
+              <a:cs typeface="TH Sarabun New" pitchFamily="34" charset="-34"/>
+            </a:endParaRPr>
           </a:p>
         </p:txBody>
       </p:sp>
@@ -5851,44 +6068,77 @@
           <a:p>
             <a:pPr lvl="0"/>
             <a:r>
-              <a:rPr lang="th-TH" dirty="0"/>
+              <a:rPr lang="th-TH" b="1" dirty="0">
+                <a:latin typeface="TH Sarabun New" pitchFamily="34" charset="-34"/>
+                <a:cs typeface="TH Sarabun New" pitchFamily="34" charset="-34"/>
+              </a:rPr>
               <a:t>ระบบจัดการชั้นเรียน </a:t>
             </a:r>
             <a:r>
-              <a:rPr lang="th-TH" dirty="0" smtClean="0"/>
+              <a:rPr lang="th-TH" b="1" dirty="0" smtClean="0">
+                <a:latin typeface="TH Sarabun New" pitchFamily="34" charset="-34"/>
+                <a:cs typeface="TH Sarabun New" pitchFamily="34" charset="-34"/>
+              </a:rPr>
               <a:t/>
             </a:r>
             <a:br>
-              <a:rPr lang="th-TH" dirty="0" smtClean="0"/>
+              <a:rPr lang="th-TH" b="1" dirty="0" smtClean="0">
+                <a:latin typeface="TH Sarabun New" pitchFamily="34" charset="-34"/>
+                <a:cs typeface="TH Sarabun New" pitchFamily="34" charset="-34"/>
+              </a:rPr>
             </a:br>
             <a:r>
-              <a:rPr lang="th-TH" dirty="0" smtClean="0"/>
+              <a:rPr lang="th-TH" b="1" dirty="0" smtClean="0">
+                <a:latin typeface="TH Sarabun New" pitchFamily="34" charset="-34"/>
+                <a:cs typeface="TH Sarabun New" pitchFamily="34" charset="-34"/>
+              </a:rPr>
               <a:t>(</a:t>
             </a:r>
             <a:r>
-              <a:rPr lang="th-TH" dirty="0" err="1"/>
+              <a:rPr lang="th-TH" b="1" dirty="0" err="1">
+                <a:latin typeface="TH Sarabun New" pitchFamily="34" charset="-34"/>
+                <a:cs typeface="TH Sarabun New" pitchFamily="34" charset="-34"/>
+              </a:rPr>
               <a:t>Class</a:t>
             </a:r>
             <a:r>
-              <a:rPr lang="th-TH" dirty="0"/>
+              <a:rPr lang="th-TH" b="1" dirty="0">
+                <a:latin typeface="TH Sarabun New" pitchFamily="34" charset="-34"/>
+                <a:cs typeface="TH Sarabun New" pitchFamily="34" charset="-34"/>
+              </a:rPr>
               <a:t> </a:t>
             </a:r>
             <a:r>
-              <a:rPr lang="th-TH" dirty="0" err="1"/>
+              <a:rPr lang="th-TH" b="1" dirty="0" err="1">
+                <a:latin typeface="TH Sarabun New" pitchFamily="34" charset="-34"/>
+                <a:cs typeface="TH Sarabun New" pitchFamily="34" charset="-34"/>
+              </a:rPr>
               <a:t>Management</a:t>
             </a:r>
             <a:r>
-              <a:rPr lang="th-TH" dirty="0"/>
+              <a:rPr lang="th-TH" b="1" dirty="0">
+                <a:latin typeface="TH Sarabun New" pitchFamily="34" charset="-34"/>
+                <a:cs typeface="TH Sarabun New" pitchFamily="34" charset="-34"/>
+              </a:rPr>
               <a:t>) </a:t>
             </a:r>
             <a:r>
-              <a:rPr lang="en-US" dirty="0"/>
+              <a:rPr lang="en-US" b="1" dirty="0">
+                <a:latin typeface="TH Sarabun New" pitchFamily="34" charset="-34"/>
+                <a:cs typeface="TH Sarabun New" pitchFamily="34" charset="-34"/>
+              </a:rPr>
               <a:t/>
             </a:r>
             <a:br>
-              <a:rPr lang="en-US" dirty="0"/>
+              <a:rPr lang="en-US" b="1" dirty="0">
+                <a:latin typeface="TH Sarabun New" pitchFamily="34" charset="-34"/>
+                <a:cs typeface="TH Sarabun New" pitchFamily="34" charset="-34"/>
+              </a:rPr>
             </a:br>
-            <a:endParaRPr lang="th-TH" dirty="0"/>
+            <a:endParaRPr lang="th-TH" b="1" dirty="0">
+              <a:latin typeface="TH Sarabun New" pitchFamily="34" charset="-34"/>
+              <a:cs typeface="TH Sarabun New" pitchFamily="34" charset="-34"/>
+            </a:endParaRPr>
           </a:p>
         </p:txBody>
       </p:sp>
@@ -5914,80 +6164,125 @@
           </a:bodyPr>
           <a:lstStyle/>
           <a:p>
-            <a:pPr marL="0" indent="0">
+            <a:pPr marL="0" indent="0" algn="thaiDist">
               <a:buNone/>
             </a:pPr>
             <a:r>
-              <a:rPr lang="th-TH" dirty="0" smtClean="0"/>
+              <a:rPr lang="th-TH" dirty="0" smtClean="0">
+                <a:latin typeface="TH Sarabun New" pitchFamily="34" charset="-34"/>
+                <a:cs typeface="TH Sarabun New" pitchFamily="34" charset="-34"/>
+              </a:rPr>
               <a:t>	เป็น</a:t>
             </a:r>
             <a:r>
-              <a:rPr lang="th-TH" dirty="0"/>
+              <a:rPr lang="th-TH" dirty="0">
+                <a:latin typeface="TH Sarabun New" pitchFamily="34" charset="-34"/>
+                <a:cs typeface="TH Sarabun New" pitchFamily="34" charset="-34"/>
+              </a:rPr>
               <a:t>ส่วนสำหรับผู้ดูแลระบบและผู้ช่วยฝึกส่วนบุคคลใช้ในการจัดการรายละเอียดข้อมูลของชั้นเรียนในศูนย์บริการออกกำลังกาย ซึ่งระบบนี้จะมีฟังก์ชันการทำงานดังต่อไปนี้</a:t>
             </a:r>
           </a:p>
           <a:p>
-            <a:r>
-              <a:rPr lang="th-TH" dirty="0" smtClean="0"/>
+            <a:pPr algn="thaiDist"/>
+            <a:r>
+              <a:rPr lang="th-TH" dirty="0" smtClean="0">
+                <a:latin typeface="TH Sarabun New" pitchFamily="34" charset="-34"/>
+                <a:cs typeface="TH Sarabun New" pitchFamily="34" charset="-34"/>
+              </a:rPr>
               <a:t>สามารถ</a:t>
             </a:r>
             <a:r>
-              <a:rPr lang="th-TH" dirty="0"/>
+              <a:rPr lang="th-TH" dirty="0">
+                <a:latin typeface="TH Sarabun New" pitchFamily="34" charset="-34"/>
+                <a:cs typeface="TH Sarabun New" pitchFamily="34" charset="-34"/>
+              </a:rPr>
               <a:t>จัดตารางเวลาโปรแกรมการสอนของผู้ช่วยฝึกส่วน</a:t>
             </a:r>
             <a:r>
-              <a:rPr lang="th-TH" dirty="0" smtClean="0"/>
+              <a:rPr lang="th-TH" dirty="0" smtClean="0">
+                <a:latin typeface="TH Sarabun New" pitchFamily="34" charset="-34"/>
+                <a:cs typeface="TH Sarabun New" pitchFamily="34" charset="-34"/>
+              </a:rPr>
               <a:t>บุคคล</a:t>
             </a:r>
           </a:p>
           <a:p>
-            <a:r>
-              <a:rPr lang="th-TH" dirty="0" smtClean="0"/>
+            <a:pPr algn="thaiDist"/>
+            <a:r>
+              <a:rPr lang="th-TH" dirty="0" smtClean="0">
+                <a:latin typeface="TH Sarabun New" pitchFamily="34" charset="-34"/>
+                <a:cs typeface="TH Sarabun New" pitchFamily="34" charset="-34"/>
+              </a:rPr>
               <a:t>สามารถ</a:t>
             </a:r>
             <a:r>
-              <a:rPr lang="th-TH" dirty="0"/>
+              <a:rPr lang="th-TH" dirty="0">
+                <a:latin typeface="TH Sarabun New" pitchFamily="34" charset="-34"/>
+                <a:cs typeface="TH Sarabun New" pitchFamily="34" charset="-34"/>
+              </a:rPr>
               <a:t>จัดเก็บ เพิ่ม ลบ แก้ไข และค้นหาข้อมูลของโปรแกรมการสอนออก</a:t>
             </a:r>
             <a:r>
-              <a:rPr lang="th-TH" dirty="0" smtClean="0"/>
-              <a:t>กำลัง</a:t>
-            </a:r>
-            <a:r>
-              <a:rPr lang="th-TH" dirty="0" smtClean="0"/>
-              <a:t>กาย</a:t>
-            </a:r>
-            <a:endParaRPr lang="th-TH" dirty="0"/>
-          </a:p>
-          <a:p>
-            <a:r>
-              <a:rPr lang="th-TH" dirty="0" smtClean="0"/>
+              <a:rPr lang="th-TH" dirty="0" smtClean="0">
+                <a:latin typeface="TH Sarabun New" pitchFamily="34" charset="-34"/>
+                <a:cs typeface="TH Sarabun New" pitchFamily="34" charset="-34"/>
+              </a:rPr>
+              <a:t>กำลังกาย</a:t>
+            </a:r>
+            <a:endParaRPr lang="th-TH" dirty="0">
+              <a:latin typeface="TH Sarabun New" pitchFamily="34" charset="-34"/>
+              <a:cs typeface="TH Sarabun New" pitchFamily="34" charset="-34"/>
+            </a:endParaRPr>
+          </a:p>
+          <a:p>
+            <a:pPr algn="thaiDist"/>
+            <a:r>
+              <a:rPr lang="th-TH" dirty="0" smtClean="0">
+                <a:latin typeface="TH Sarabun New" pitchFamily="34" charset="-34"/>
+                <a:cs typeface="TH Sarabun New" pitchFamily="34" charset="-34"/>
+              </a:rPr>
               <a:t>สามารถ</a:t>
             </a:r>
             <a:r>
-              <a:rPr lang="th-TH" dirty="0"/>
+              <a:rPr lang="th-TH" dirty="0">
+                <a:latin typeface="TH Sarabun New" pitchFamily="34" charset="-34"/>
+                <a:cs typeface="TH Sarabun New" pitchFamily="34" charset="-34"/>
+              </a:rPr>
               <a:t>จัดเก็บตารางการทำงานของพนักงานผู้ช่วยฝึกส่วน</a:t>
             </a:r>
             <a:r>
-              <a:rPr lang="th-TH" dirty="0" smtClean="0"/>
+              <a:rPr lang="th-TH" dirty="0" smtClean="0">
+                <a:latin typeface="TH Sarabun New" pitchFamily="34" charset="-34"/>
+                <a:cs typeface="TH Sarabun New" pitchFamily="34" charset="-34"/>
+              </a:rPr>
               <a:t>บุคคล</a:t>
             </a:r>
           </a:p>
           <a:p>
-            <a:r>
-              <a:rPr lang="th-TH" dirty="0" smtClean="0"/>
+            <a:pPr algn="thaiDist"/>
+            <a:r>
+              <a:rPr lang="th-TH" dirty="0" smtClean="0">
+                <a:latin typeface="TH Sarabun New" pitchFamily="34" charset="-34"/>
+                <a:cs typeface="TH Sarabun New" pitchFamily="34" charset="-34"/>
+              </a:rPr>
               <a:t>สามารถ</a:t>
             </a:r>
             <a:r>
-              <a:rPr lang="th-TH" dirty="0"/>
+              <a:rPr lang="th-TH" dirty="0">
+                <a:latin typeface="TH Sarabun New" pitchFamily="34" charset="-34"/>
+                <a:cs typeface="TH Sarabun New" pitchFamily="34" charset="-34"/>
+              </a:rPr>
               <a:t>จัดเก็บจำนวนสมาชิกที่เข้าเรียนในแต่ละชั้นเรียน</a:t>
             </a:r>
           </a:p>
           <a:p>
-            <a:pPr marL="457200" indent="-457200">
+            <a:pPr marL="457200" indent="-457200" algn="thaiDist">
               <a:buAutoNum type="arabicPeriod" startAt="2"/>
             </a:pPr>
-            <a:endParaRPr lang="th-TH" b="1" dirty="0"/>
+            <a:endParaRPr lang="th-TH" b="1" dirty="0">
+              <a:latin typeface="TH Sarabun New" pitchFamily="34" charset="-34"/>
+              <a:cs typeface="TH Sarabun New" pitchFamily="34" charset="-34"/>
+            </a:endParaRPr>
           </a:p>
         </p:txBody>
       </p:sp>
@@ -6051,32 +6346,49 @@
           <a:lstStyle/>
           <a:p>
             <a:r>
-              <a:rPr lang="th-TH" dirty="0"/>
+              <a:rPr lang="th-TH" b="1" dirty="0">
+                <a:latin typeface="TH Sarabun New" pitchFamily="34" charset="-34"/>
+                <a:cs typeface="TH Sarabun New" pitchFamily="34" charset="-34"/>
+              </a:rPr>
               <a:t>ระบบจัดการสินค้าคงคลัง </a:t>
             </a:r>
             <a:r>
-              <a:rPr lang="en-US" dirty="0" smtClean="0"/>
+              <a:rPr lang="en-US" b="1" dirty="0" smtClean="0">
+                <a:latin typeface="TH Sarabun New" pitchFamily="34" charset="-34"/>
+                <a:cs typeface="TH Sarabun New" pitchFamily="34" charset="-34"/>
+              </a:rPr>
               <a:t/>
             </a:r>
             <a:br>
-              <a:rPr lang="en-US" dirty="0" smtClean="0"/>
+              <a:rPr lang="en-US" b="1" dirty="0" smtClean="0">
+                <a:latin typeface="TH Sarabun New" pitchFamily="34" charset="-34"/>
+                <a:cs typeface="TH Sarabun New" pitchFamily="34" charset="-34"/>
+              </a:rPr>
             </a:br>
             <a:r>
-              <a:rPr lang="en-US" dirty="0" smtClean="0"/>
+              <a:rPr lang="en-US" b="1" dirty="0" smtClean="0">
+                <a:latin typeface="TH Sarabun New" pitchFamily="34" charset="-34"/>
+                <a:cs typeface="TH Sarabun New" pitchFamily="34" charset="-34"/>
+              </a:rPr>
               <a:t>(</a:t>
             </a:r>
             <a:r>
-              <a:rPr lang="en-US" dirty="0"/>
+              <a:rPr lang="en-US" b="1" dirty="0">
+                <a:latin typeface="TH Sarabun New" pitchFamily="34" charset="-34"/>
+                <a:cs typeface="TH Sarabun New" pitchFamily="34" charset="-34"/>
+              </a:rPr>
               <a:t>Inventory Management) </a:t>
             </a:r>
-            <a:r>
-              <a:rPr lang="en-US" b="1" dirty="0"/>
-              <a:t/>
-            </a:r>
             <a:br>
-              <a:rPr lang="en-US" b="1" dirty="0"/>
+              <a:rPr lang="en-US" b="1" dirty="0">
+                <a:latin typeface="TH Sarabun New" pitchFamily="34" charset="-34"/>
+                <a:cs typeface="TH Sarabun New" pitchFamily="34" charset="-34"/>
+              </a:rPr>
             </a:br>
-            <a:endParaRPr lang="th-TH" dirty="0"/>
+            <a:endParaRPr lang="th-TH" b="1" dirty="0">
+              <a:latin typeface="TH Sarabun New" pitchFamily="34" charset="-34"/>
+              <a:cs typeface="TH Sarabun New" pitchFamily="34" charset="-34"/>
+            </a:endParaRPr>
           </a:p>
         </p:txBody>
       </p:sp>
@@ -6093,12 +6405,12 @@
         <p:spPr>
           <a:xfrm>
             <a:off x="457200" y="1936751"/>
-            <a:ext cx="8229600" cy="2590800"/>
+            <a:ext cx="8229600" cy="2826635"/>
           </a:xfrm>
         </p:spPr>
         <p:txBody>
           <a:bodyPr>
-            <a:normAutofit/>
+            <a:noAutofit/>
           </a:bodyPr>
           <a:lstStyle/>
           <a:p>
@@ -6106,54 +6418,90 @@
               <a:buNone/>
             </a:pPr>
             <a:r>
-              <a:rPr lang="th-TH" sz="2500" dirty="0" smtClean="0"/>
-              <a:t>เป็น</a:t>
-            </a:r>
-            <a:r>
-              <a:rPr lang="th-TH" sz="2500" dirty="0"/>
+              <a:rPr lang="th-TH" dirty="0" smtClean="0">
+                <a:latin typeface="TH Sarabun New" pitchFamily="34" charset="-34"/>
+                <a:cs typeface="TH Sarabun New" pitchFamily="34" charset="-34"/>
+              </a:rPr>
+              <a:t>	เป็น</a:t>
+            </a:r>
+            <a:r>
+              <a:rPr lang="th-TH" dirty="0">
+                <a:latin typeface="TH Sarabun New" pitchFamily="34" charset="-34"/>
+                <a:cs typeface="TH Sarabun New" pitchFamily="34" charset="-34"/>
+              </a:rPr>
               <a:t>ส่วนสำหรับพนักงานบริการลูกค้าและพนักงานบัญชี ใช้ตรวจสอบยอดขาย </a:t>
             </a:r>
             <a:r>
-              <a:rPr lang="th-TH" sz="2500" dirty="0" smtClean="0"/>
+              <a:rPr lang="th-TH" dirty="0" smtClean="0">
+                <a:latin typeface="TH Sarabun New" pitchFamily="34" charset="-34"/>
+                <a:cs typeface="TH Sarabun New" pitchFamily="34" charset="-34"/>
+              </a:rPr>
               <a:t>และจำนวน</a:t>
             </a:r>
             <a:r>
-              <a:rPr lang="th-TH" sz="2500" dirty="0"/>
+              <a:rPr lang="th-TH" dirty="0">
+                <a:latin typeface="TH Sarabun New" pitchFamily="34" charset="-34"/>
+                <a:cs typeface="TH Sarabun New" pitchFamily="34" charset="-34"/>
+              </a:rPr>
               <a:t>สินค้าคงคลัง</a:t>
             </a:r>
           </a:p>
           <a:p>
             <a:r>
-              <a:rPr lang="th-TH" sz="2500" dirty="0" smtClean="0"/>
+              <a:rPr lang="th-TH" dirty="0" smtClean="0">
+                <a:latin typeface="TH Sarabun New" pitchFamily="34" charset="-34"/>
+                <a:cs typeface="TH Sarabun New" pitchFamily="34" charset="-34"/>
+              </a:rPr>
               <a:t>สามารถ</a:t>
             </a:r>
             <a:r>
-              <a:rPr lang="th-TH" sz="2500" dirty="0"/>
+              <a:rPr lang="th-TH" dirty="0">
+                <a:latin typeface="TH Sarabun New" pitchFamily="34" charset="-34"/>
+                <a:cs typeface="TH Sarabun New" pitchFamily="34" charset="-34"/>
+              </a:rPr>
               <a:t>ตรวจสอบยอดขายประจำวัน</a:t>
             </a:r>
             <a:r>
-              <a:rPr lang="th-TH" sz="2500" dirty="0" smtClean="0"/>
+              <a:rPr lang="th-TH" dirty="0" smtClean="0">
+                <a:latin typeface="TH Sarabun New" pitchFamily="34" charset="-34"/>
+                <a:cs typeface="TH Sarabun New" pitchFamily="34" charset="-34"/>
+              </a:rPr>
               <a:t>ได้</a:t>
             </a:r>
           </a:p>
           <a:p>
             <a:r>
-              <a:rPr lang="th-TH" sz="2500" dirty="0" smtClean="0"/>
+              <a:rPr lang="th-TH" dirty="0" smtClean="0">
+                <a:latin typeface="TH Sarabun New" pitchFamily="34" charset="-34"/>
+                <a:cs typeface="TH Sarabun New" pitchFamily="34" charset="-34"/>
+              </a:rPr>
               <a:t>สามารถ</a:t>
             </a:r>
             <a:r>
-              <a:rPr lang="th-TH" sz="2500" dirty="0"/>
+              <a:rPr lang="th-TH" dirty="0">
+                <a:latin typeface="TH Sarabun New" pitchFamily="34" charset="-34"/>
+                <a:cs typeface="TH Sarabun New" pitchFamily="34" charset="-34"/>
+              </a:rPr>
               <a:t>จัดการรายละเอียดข้อมูลสินค้าได้ </a:t>
             </a:r>
-            <a:endParaRPr lang="th-TH" sz="2500" dirty="0" smtClean="0"/>
-          </a:p>
-          <a:p>
-            <a:r>
-              <a:rPr lang="th-TH" sz="2500" dirty="0" smtClean="0"/>
+            <a:endParaRPr lang="th-TH" dirty="0" smtClean="0">
+              <a:latin typeface="TH Sarabun New" pitchFamily="34" charset="-34"/>
+              <a:cs typeface="TH Sarabun New" pitchFamily="34" charset="-34"/>
+            </a:endParaRPr>
+          </a:p>
+          <a:p>
+            <a:r>
+              <a:rPr lang="th-TH" dirty="0" smtClean="0">
+                <a:latin typeface="TH Sarabun New" pitchFamily="34" charset="-34"/>
+                <a:cs typeface="TH Sarabun New" pitchFamily="34" charset="-34"/>
+              </a:rPr>
               <a:t>สามารถ</a:t>
             </a:r>
             <a:r>
-              <a:rPr lang="th-TH" sz="2500" dirty="0"/>
+              <a:rPr lang="th-TH" dirty="0">
+                <a:latin typeface="TH Sarabun New" pitchFamily="34" charset="-34"/>
+                <a:cs typeface="TH Sarabun New" pitchFamily="34" charset="-34"/>
+              </a:rPr>
               <a:t>จัดการสินค้าในคลังสินค้าได้</a:t>
             </a:r>
           </a:p>
@@ -6161,7 +6509,10 @@
             <a:pPr marL="457200" indent="-457200">
               <a:buAutoNum type="arabicPeriod" startAt="4"/>
             </a:pPr>
-            <a:endParaRPr lang="th-TH" sz="2500" b="1" dirty="0"/>
+            <a:endParaRPr lang="th-TH" b="1" dirty="0">
+              <a:latin typeface="TH Sarabun New" pitchFamily="34" charset="-34"/>
+              <a:cs typeface="TH Sarabun New" pitchFamily="34" charset="-34"/>
+            </a:endParaRPr>
           </a:p>
         </p:txBody>
       </p:sp>
@@ -6220,25 +6571,43 @@
           <a:lstStyle/>
           <a:p>
             <a:r>
-              <a:rPr lang="th-TH" dirty="0"/>
+              <a:rPr lang="th-TH" b="1" dirty="0">
+                <a:latin typeface="TH Sarabun New" pitchFamily="34" charset="-34"/>
+                <a:cs typeface="TH Sarabun New" pitchFamily="34" charset="-34"/>
+              </a:rPr>
               <a:t>ระบบออกรายงาน </a:t>
             </a:r>
             <a:r>
-              <a:rPr lang="th-TH" dirty="0" smtClean="0"/>
+              <a:rPr lang="th-TH" b="1" dirty="0" smtClean="0">
+                <a:latin typeface="TH Sarabun New" pitchFamily="34" charset="-34"/>
+                <a:cs typeface="TH Sarabun New" pitchFamily="34" charset="-34"/>
+              </a:rPr>
               <a:t/>
             </a:r>
             <a:br>
-              <a:rPr lang="th-TH" dirty="0" smtClean="0"/>
+              <a:rPr lang="th-TH" b="1" dirty="0" smtClean="0">
+                <a:latin typeface="TH Sarabun New" pitchFamily="34" charset="-34"/>
+                <a:cs typeface="TH Sarabun New" pitchFamily="34" charset="-34"/>
+              </a:rPr>
             </a:br>
             <a:r>
-              <a:rPr lang="th-TH" dirty="0" smtClean="0"/>
+              <a:rPr lang="th-TH" b="1" dirty="0" smtClean="0">
+                <a:latin typeface="TH Sarabun New" pitchFamily="34" charset="-34"/>
+                <a:cs typeface="TH Sarabun New" pitchFamily="34" charset="-34"/>
+              </a:rPr>
               <a:t>(</a:t>
             </a:r>
             <a:r>
-              <a:rPr lang="en-US" dirty="0"/>
+              <a:rPr lang="en-US" b="1" dirty="0">
+                <a:latin typeface="TH Sarabun New" pitchFamily="34" charset="-34"/>
+                <a:cs typeface="TH Sarabun New" pitchFamily="34" charset="-34"/>
+              </a:rPr>
               <a:t>Report Management)</a:t>
             </a:r>
-            <a:endParaRPr lang="th-TH" dirty="0"/>
+            <a:endParaRPr lang="th-TH" b="1" dirty="0">
+              <a:latin typeface="TH Sarabun New" pitchFamily="34" charset="-34"/>
+              <a:cs typeface="TH Sarabun New" pitchFamily="34" charset="-34"/>
+            </a:endParaRPr>
           </a:p>
         </p:txBody>
       </p:sp>
@@ -6268,57 +6637,320 @@
               <a:buNone/>
             </a:pPr>
             <a:r>
-              <a:rPr lang="th-TH" dirty="0" smtClean="0"/>
-              <a:t>เป็น</a:t>
-            </a:r>
-            <a:r>
-              <a:rPr lang="th-TH" dirty="0"/>
+              <a:rPr lang="th-TH" dirty="0" smtClean="0">
+                <a:latin typeface="TH Sarabun New" pitchFamily="34" charset="-34"/>
+                <a:cs typeface="TH Sarabun New" pitchFamily="34" charset="-34"/>
+              </a:rPr>
+              <a:t>	เป็น</a:t>
+            </a:r>
+            <a:r>
+              <a:rPr lang="th-TH" dirty="0">
+                <a:latin typeface="TH Sarabun New" pitchFamily="34" charset="-34"/>
+                <a:cs typeface="TH Sarabun New" pitchFamily="34" charset="-34"/>
+              </a:rPr>
               <a:t>ระบบที่ใช้ในการออกรายงานเพื่อสนับสนุนการทำงานของพนักงานแต่ละหน้าที่ โดยระบบจะประกอบไปด้วยรายงานดังต่อไปนี้</a:t>
             </a:r>
           </a:p>
           <a:p>
             <a:r>
-              <a:rPr lang="th-TH" dirty="0" smtClean="0"/>
+              <a:rPr lang="th-TH" dirty="0" smtClean="0">
+                <a:latin typeface="TH Sarabun New" pitchFamily="34" charset="-34"/>
+                <a:cs typeface="TH Sarabun New" pitchFamily="34" charset="-34"/>
+              </a:rPr>
               <a:t>รายงาน</a:t>
             </a:r>
             <a:r>
-              <a:rPr lang="th-TH" dirty="0"/>
+              <a:rPr lang="th-TH" dirty="0">
+                <a:latin typeface="TH Sarabun New" pitchFamily="34" charset="-34"/>
+                <a:cs typeface="TH Sarabun New" pitchFamily="34" charset="-34"/>
+              </a:rPr>
               <a:t>ข้อมูลสมาชิกประเภท</a:t>
             </a:r>
             <a:r>
-              <a:rPr lang="th-TH" dirty="0" smtClean="0"/>
+              <a:rPr lang="th-TH" dirty="0" smtClean="0">
+                <a:latin typeface="TH Sarabun New" pitchFamily="34" charset="-34"/>
+                <a:cs typeface="TH Sarabun New" pitchFamily="34" charset="-34"/>
+              </a:rPr>
               <a:t>ต่างๆ </a:t>
             </a:r>
-            <a:endParaRPr lang="th-TH" dirty="0" smtClean="0"/>
-          </a:p>
-          <a:p>
-            <a:r>
-              <a:rPr lang="th-TH" dirty="0" smtClean="0"/>
+          </a:p>
+          <a:p>
+            <a:r>
+              <a:rPr lang="th-TH" dirty="0" smtClean="0">
+                <a:latin typeface="TH Sarabun New" pitchFamily="34" charset="-34"/>
+                <a:cs typeface="TH Sarabun New" pitchFamily="34" charset="-34"/>
+              </a:rPr>
               <a:t>รายงาน</a:t>
             </a:r>
             <a:r>
-              <a:rPr lang="th-TH" dirty="0"/>
+              <a:rPr lang="th-TH" dirty="0">
+                <a:latin typeface="TH Sarabun New" pitchFamily="34" charset="-34"/>
+                <a:cs typeface="TH Sarabun New" pitchFamily="34" charset="-34"/>
+              </a:rPr>
               <a:t>ข้อมูลรายรับ</a:t>
             </a:r>
             <a:r>
-              <a:rPr lang="th-TH" dirty="0" smtClean="0"/>
+              <a:rPr lang="th-TH" dirty="0" smtClean="0">
+                <a:latin typeface="TH Sarabun New" pitchFamily="34" charset="-34"/>
+                <a:cs typeface="TH Sarabun New" pitchFamily="34" charset="-34"/>
+              </a:rPr>
               <a:t>รายจ่าย</a:t>
             </a:r>
           </a:p>
           <a:p>
             <a:r>
-              <a:rPr lang="th-TH" dirty="0" smtClean="0"/>
+              <a:rPr lang="th-TH" dirty="0" smtClean="0">
+                <a:latin typeface="TH Sarabun New" pitchFamily="34" charset="-34"/>
+                <a:cs typeface="TH Sarabun New" pitchFamily="34" charset="-34"/>
+              </a:rPr>
               <a:t>รายงาน</a:t>
             </a:r>
             <a:r>
-              <a:rPr lang="th-TH" dirty="0"/>
-              <a:t>ฉบับนี้เป็นรายงานสรุปผล</a:t>
-            </a:r>
-            <a:r>
-              <a:rPr lang="th-TH" dirty="0" smtClean="0"/>
+              <a:rPr lang="th-TH" dirty="0">
+                <a:latin typeface="TH Sarabun New" pitchFamily="34" charset="-34"/>
+                <a:cs typeface="TH Sarabun New" pitchFamily="34" charset="-34"/>
+              </a:rPr>
+              <a:t>สรุปผล</a:t>
+            </a:r>
+            <a:r>
+              <a:rPr lang="th-TH" dirty="0" smtClean="0">
+                <a:latin typeface="TH Sarabun New" pitchFamily="34" charset="-34"/>
+                <a:cs typeface="TH Sarabun New" pitchFamily="34" charset="-34"/>
+              </a:rPr>
               <a:t>ยอดขาย</a:t>
             </a:r>
-            <a:endParaRPr lang="th-TH" b="1" dirty="0"/>
+            <a:endParaRPr lang="th-TH" b="1" dirty="0">
+              <a:latin typeface="TH Sarabun New" pitchFamily="34" charset="-34"/>
+              <a:cs typeface="TH Sarabun New" pitchFamily="34" charset="-34"/>
+            </a:endParaRPr>
+          </a:p>
+        </p:txBody>
+      </p:sp>
+      <p:sp>
+        <p:nvSpPr>
+          <p:cNvPr id="4" name="Content Placeholder 2"/>
+          <p:cNvSpPr txBox="1">
+            <a:spLocks/>
+          </p:cNvSpPr>
+          <p:nvPr/>
+        </p:nvSpPr>
+        <p:spPr>
+          <a:xfrm>
+            <a:off x="4773574" y="3302887"/>
+            <a:ext cx="3856075" cy="3105150"/>
+          </a:xfrm>
+          <a:prstGeom prst="rect">
+            <a:avLst/>
+          </a:prstGeom>
+        </p:spPr>
+        <p:style>
+          <a:lnRef idx="1">
+            <a:schemeClr val="accent2"/>
+          </a:lnRef>
+          <a:fillRef idx="2">
+            <a:schemeClr val="accent2"/>
+          </a:fillRef>
+          <a:effectRef idx="1">
+            <a:schemeClr val="accent2"/>
+          </a:effectRef>
+          <a:fontRef idx="minor">
+            <a:schemeClr val="dk1"/>
+          </a:fontRef>
+        </p:style>
+        <p:txBody>
+          <a:bodyPr vert="horz" lIns="91440" tIns="45720" rIns="91440" bIns="45720" rtlCol="0">
+            <a:normAutofit fontScale="85000" lnSpcReduction="20000"/>
+          </a:bodyPr>
+          <a:lstStyle>
+            <a:lvl1pPr marL="342900" indent="-342900" algn="l" defTabSz="457200" rtl="0" eaLnBrk="1" latinLnBrk="0" hangingPunct="1">
+              <a:spcBef>
+                <a:spcPct val="20000"/>
+              </a:spcBef>
+              <a:buFont typeface="Arial"/>
+              <a:buChar char="•"/>
+              <a:defRPr sz="3200" kern="1200">
+                <a:solidFill>
+                  <a:srgbClr val="000000"/>
+                </a:solidFill>
+                <a:latin typeface="+mn-lt"/>
+                <a:ea typeface="+mn-ea"/>
+                <a:cs typeface="+mn-cs"/>
+              </a:defRPr>
+            </a:lvl1pPr>
+            <a:lvl2pPr marL="742950" indent="-285750" algn="l" defTabSz="457200" rtl="0" eaLnBrk="1" latinLnBrk="0" hangingPunct="1">
+              <a:spcBef>
+                <a:spcPct val="20000"/>
+              </a:spcBef>
+              <a:buFont typeface="Arial"/>
+              <a:buChar char="–"/>
+              <a:defRPr sz="2800" kern="1200">
+                <a:solidFill>
+                  <a:srgbClr val="000000"/>
+                </a:solidFill>
+                <a:latin typeface="+mn-lt"/>
+                <a:ea typeface="+mn-ea"/>
+                <a:cs typeface="+mn-cs"/>
+              </a:defRPr>
+            </a:lvl2pPr>
+            <a:lvl3pPr marL="1143000" indent="-228600" algn="l" defTabSz="457200" rtl="0" eaLnBrk="1" latinLnBrk="0" hangingPunct="1">
+              <a:spcBef>
+                <a:spcPct val="20000"/>
+              </a:spcBef>
+              <a:buFont typeface="Arial"/>
+              <a:buChar char="•"/>
+              <a:defRPr sz="2400" kern="1200">
+                <a:solidFill>
+                  <a:srgbClr val="000000"/>
+                </a:solidFill>
+                <a:latin typeface="+mn-lt"/>
+                <a:ea typeface="+mn-ea"/>
+                <a:cs typeface="+mn-cs"/>
+              </a:defRPr>
+            </a:lvl3pPr>
+            <a:lvl4pPr marL="1600200" indent="-228600" algn="l" defTabSz="457200" rtl="0" eaLnBrk="1" latinLnBrk="0" hangingPunct="1">
+              <a:spcBef>
+                <a:spcPct val="20000"/>
+              </a:spcBef>
+              <a:buFont typeface="Arial"/>
+              <a:buChar char="–"/>
+              <a:defRPr sz="2000" kern="1200">
+                <a:solidFill>
+                  <a:srgbClr val="000000"/>
+                </a:solidFill>
+                <a:latin typeface="+mn-lt"/>
+                <a:ea typeface="+mn-ea"/>
+                <a:cs typeface="+mn-cs"/>
+              </a:defRPr>
+            </a:lvl4pPr>
+            <a:lvl5pPr marL="2057400" indent="-228600" algn="l" defTabSz="457200" rtl="0" eaLnBrk="1" latinLnBrk="0" hangingPunct="1">
+              <a:spcBef>
+                <a:spcPct val="20000"/>
+              </a:spcBef>
+              <a:buFont typeface="Arial"/>
+              <a:buChar char="»"/>
+              <a:defRPr sz="2000" kern="1200">
+                <a:solidFill>
+                  <a:srgbClr val="000000"/>
+                </a:solidFill>
+                <a:latin typeface="+mn-lt"/>
+                <a:ea typeface="+mn-ea"/>
+                <a:cs typeface="+mn-cs"/>
+              </a:defRPr>
+            </a:lvl5pPr>
+            <a:lvl6pPr marL="2514600" indent="-228600" algn="l" defTabSz="457200" rtl="0" eaLnBrk="1" latinLnBrk="0" hangingPunct="1">
+              <a:spcBef>
+                <a:spcPct val="20000"/>
+              </a:spcBef>
+              <a:buFont typeface="Arial"/>
+              <a:buChar char="•"/>
+              <a:defRPr sz="2000" kern="1200">
+                <a:solidFill>
+                  <a:schemeClr val="tx1"/>
+                </a:solidFill>
+                <a:latin typeface="+mn-lt"/>
+                <a:ea typeface="+mn-ea"/>
+                <a:cs typeface="+mn-cs"/>
+              </a:defRPr>
+            </a:lvl6pPr>
+            <a:lvl7pPr marL="2971800" indent="-228600" algn="l" defTabSz="457200" rtl="0" eaLnBrk="1" latinLnBrk="0" hangingPunct="1">
+              <a:spcBef>
+                <a:spcPct val="20000"/>
+              </a:spcBef>
+              <a:buFont typeface="Arial"/>
+              <a:buChar char="•"/>
+              <a:defRPr sz="2000" kern="1200">
+                <a:solidFill>
+                  <a:schemeClr val="tx1"/>
+                </a:solidFill>
+                <a:latin typeface="+mn-lt"/>
+                <a:ea typeface="+mn-ea"/>
+                <a:cs typeface="+mn-cs"/>
+              </a:defRPr>
+            </a:lvl7pPr>
+            <a:lvl8pPr marL="3429000" indent="-228600" algn="l" defTabSz="457200" rtl="0" eaLnBrk="1" latinLnBrk="0" hangingPunct="1">
+              <a:spcBef>
+                <a:spcPct val="20000"/>
+              </a:spcBef>
+              <a:buFont typeface="Arial"/>
+              <a:buChar char="•"/>
+              <a:defRPr sz="2000" kern="1200">
+                <a:solidFill>
+                  <a:schemeClr val="tx1"/>
+                </a:solidFill>
+                <a:latin typeface="+mn-lt"/>
+                <a:ea typeface="+mn-ea"/>
+                <a:cs typeface="+mn-cs"/>
+              </a:defRPr>
+            </a:lvl8pPr>
+            <a:lvl9pPr marL="3886200" indent="-228600" algn="l" defTabSz="457200" rtl="0" eaLnBrk="1" latinLnBrk="0" hangingPunct="1">
+              <a:spcBef>
+                <a:spcPct val="20000"/>
+              </a:spcBef>
+              <a:buFont typeface="Arial"/>
+              <a:buChar char="•"/>
+              <a:defRPr sz="2000" kern="1200">
+                <a:solidFill>
+                  <a:schemeClr val="tx1"/>
+                </a:solidFill>
+                <a:latin typeface="+mn-lt"/>
+                <a:ea typeface="+mn-ea"/>
+                <a:cs typeface="+mn-cs"/>
+              </a:defRPr>
+            </a:lvl9pPr>
+          </a:lstStyle>
+          <a:p>
+            <a:pPr algn="thaiDist"/>
+            <a:r>
+              <a:rPr lang="th-TH" dirty="0" smtClean="0">
+                <a:latin typeface="TH Sarabun New" pitchFamily="34" charset="-34"/>
+                <a:cs typeface="TH Sarabun New" pitchFamily="34" charset="-34"/>
+              </a:rPr>
+              <a:t>รายงานบันทึกข้อมูลการสอนของผู้ช่วยฝึกสอน</a:t>
+            </a:r>
+          </a:p>
+          <a:p>
+            <a:pPr algn="thaiDist"/>
+            <a:r>
+              <a:rPr lang="th-TH" dirty="0" smtClean="0">
+                <a:latin typeface="TH Sarabun New" pitchFamily="34" charset="-34"/>
+                <a:cs typeface="TH Sarabun New" pitchFamily="34" charset="-34"/>
+              </a:rPr>
+              <a:t>รายงานจำนวนสมาชิกที่เข้าใช้บริการในแต่ละชั้นเรียน</a:t>
+            </a:r>
+          </a:p>
+          <a:p>
+            <a:pPr algn="thaiDist"/>
+            <a:r>
+              <a:rPr lang="th-TH" dirty="0" smtClean="0">
+                <a:latin typeface="TH Sarabun New" pitchFamily="34" charset="-34"/>
+                <a:cs typeface="TH Sarabun New" pitchFamily="34" charset="-34"/>
+              </a:rPr>
+              <a:t>รายงานประจำเดือนค่านายหน้าของพนักงาน</a:t>
+            </a:r>
+          </a:p>
+          <a:p>
+            <a:pPr algn="thaiDist"/>
+            <a:r>
+              <a:rPr lang="th-TH" dirty="0" smtClean="0">
+                <a:latin typeface="TH Sarabun New" pitchFamily="34" charset="-34"/>
+                <a:cs typeface="TH Sarabun New" pitchFamily="34" charset="-34"/>
+              </a:rPr>
+              <a:t>รายงานสินค้าคงคลัง</a:t>
+            </a:r>
+          </a:p>
+          <a:p>
+            <a:pPr algn="thaiDist"/>
+            <a:r>
+              <a:rPr lang="th-TH" dirty="0" smtClean="0">
+                <a:latin typeface="TH Sarabun New" pitchFamily="34" charset="-34"/>
+                <a:cs typeface="TH Sarabun New" pitchFamily="34" charset="-34"/>
+              </a:rPr>
+              <a:t>รายงานสรุปยอดขายประจำวัน</a:t>
+            </a:r>
+            <a:endParaRPr lang="th-TH" dirty="0">
+              <a:latin typeface="TH Sarabun New" pitchFamily="34" charset="-34"/>
+              <a:cs typeface="TH Sarabun New" pitchFamily="34" charset="-34"/>
+            </a:endParaRPr>
           </a:p>
         </p:txBody>
       </p:sp>
@@ -6335,9 +6967,390 @@
   <p:timing>
     <p:tnLst>
       <p:par>
-        <p:cTn id="1" dur="indefinite" restart="never" nodeType="tmRoot"/>
+        <p:cTn id="1" dur="indefinite" restart="never" nodeType="tmRoot">
+          <p:childTnLst>
+            <p:seq concurrent="1" nextAc="seek">
+              <p:cTn id="2" dur="indefinite" nodeType="mainSeq">
+                <p:childTnLst>
+                  <p:par>
+                    <p:cTn id="3" fill="hold">
+                      <p:stCondLst>
+                        <p:cond delay="indefinite"/>
+                      </p:stCondLst>
+                      <p:childTnLst>
+                        <p:par>
+                          <p:cTn id="4" fill="hold">
+                            <p:stCondLst>
+                              <p:cond delay="0"/>
+                            </p:stCondLst>
+                            <p:childTnLst>
+                              <p:par>
+                                <p:cTn id="5" presetID="10" presetClass="entr" presetSubtype="0" fill="hold" grpId="0" nodeType="clickEffect">
+                                  <p:stCondLst>
+                                    <p:cond delay="0"/>
+                                  </p:stCondLst>
+                                  <p:childTnLst>
+                                    <p:set>
+                                      <p:cBhvr>
+                                        <p:cTn id="6" dur="1" fill="hold">
+                                          <p:stCondLst>
+                                            <p:cond delay="0"/>
+                                          </p:stCondLst>
+                                        </p:cTn>
+                                        <p:tgtEl>
+                                          <p:spTgt spid="3">
+                                            <p:bg/>
+                                          </p:spTgt>
+                                        </p:tgtEl>
+                                        <p:attrNameLst>
+                                          <p:attrName>style.visibility</p:attrName>
+                                        </p:attrNameLst>
+                                      </p:cBhvr>
+                                      <p:to>
+                                        <p:strVal val="visible"/>
+                                      </p:to>
+                                    </p:set>
+                                    <p:animEffect transition="in" filter="fade">
+                                      <p:cBhvr>
+                                        <p:cTn id="7" dur="500"/>
+                                        <p:tgtEl>
+                                          <p:spTgt spid="3">
+                                            <p:bg/>
+                                          </p:spTgt>
+                                        </p:tgtEl>
+                                      </p:cBhvr>
+                                    </p:animEffect>
+                                  </p:childTnLst>
+                                </p:cTn>
+                              </p:par>
+                            </p:childTnLst>
+                          </p:cTn>
+                        </p:par>
+                      </p:childTnLst>
+                    </p:cTn>
+                  </p:par>
+                  <p:par>
+                    <p:cTn id="8" fill="hold">
+                      <p:stCondLst>
+                        <p:cond delay="indefinite"/>
+                      </p:stCondLst>
+                      <p:childTnLst>
+                        <p:par>
+                          <p:cTn id="9" fill="hold">
+                            <p:stCondLst>
+                              <p:cond delay="0"/>
+                            </p:stCondLst>
+                            <p:childTnLst>
+                              <p:par>
+                                <p:cTn id="10" presetID="10" presetClass="entr" presetSubtype="0" fill="hold" grpId="0" nodeType="clickEffect">
+                                  <p:stCondLst>
+                                    <p:cond delay="0"/>
+                                  </p:stCondLst>
+                                  <p:childTnLst>
+                                    <p:set>
+                                      <p:cBhvr>
+                                        <p:cTn id="11" dur="1" fill="hold">
+                                          <p:stCondLst>
+                                            <p:cond delay="0"/>
+                                          </p:stCondLst>
+                                        </p:cTn>
+                                        <p:tgtEl>
+                                          <p:spTgt spid="3">
+                                            <p:txEl>
+                                              <p:pRg st="0" end="0"/>
+                                            </p:txEl>
+                                          </p:spTgt>
+                                        </p:tgtEl>
+                                        <p:attrNameLst>
+                                          <p:attrName>style.visibility</p:attrName>
+                                        </p:attrNameLst>
+                                      </p:cBhvr>
+                                      <p:to>
+                                        <p:strVal val="visible"/>
+                                      </p:to>
+                                    </p:set>
+                                    <p:animEffect transition="in" filter="fade">
+                                      <p:cBhvr>
+                                        <p:cTn id="12" dur="500"/>
+                                        <p:tgtEl>
+                                          <p:spTgt spid="3">
+                                            <p:txEl>
+                                              <p:pRg st="0" end="0"/>
+                                            </p:txEl>
+                                          </p:spTgt>
+                                        </p:tgtEl>
+                                      </p:cBhvr>
+                                    </p:animEffect>
+                                  </p:childTnLst>
+                                </p:cTn>
+                              </p:par>
+                            </p:childTnLst>
+                          </p:cTn>
+                        </p:par>
+                      </p:childTnLst>
+                    </p:cTn>
+                  </p:par>
+                  <p:par>
+                    <p:cTn id="13" fill="hold">
+                      <p:stCondLst>
+                        <p:cond delay="indefinite"/>
+                      </p:stCondLst>
+                      <p:childTnLst>
+                        <p:par>
+                          <p:cTn id="14" fill="hold">
+                            <p:stCondLst>
+                              <p:cond delay="0"/>
+                            </p:stCondLst>
+                            <p:childTnLst>
+                              <p:par>
+                                <p:cTn id="15" presetID="10" presetClass="entr" presetSubtype="0" fill="hold" grpId="0" nodeType="clickEffect">
+                                  <p:stCondLst>
+                                    <p:cond delay="0"/>
+                                  </p:stCondLst>
+                                  <p:childTnLst>
+                                    <p:set>
+                                      <p:cBhvr>
+                                        <p:cTn id="16" dur="1" fill="hold">
+                                          <p:stCondLst>
+                                            <p:cond delay="0"/>
+                                          </p:stCondLst>
+                                        </p:cTn>
+                                        <p:tgtEl>
+                                          <p:spTgt spid="3">
+                                            <p:txEl>
+                                              <p:pRg st="1" end="1"/>
+                                            </p:txEl>
+                                          </p:spTgt>
+                                        </p:tgtEl>
+                                        <p:attrNameLst>
+                                          <p:attrName>style.visibility</p:attrName>
+                                        </p:attrNameLst>
+                                      </p:cBhvr>
+                                      <p:to>
+                                        <p:strVal val="visible"/>
+                                      </p:to>
+                                    </p:set>
+                                    <p:animEffect transition="in" filter="fade">
+                                      <p:cBhvr>
+                                        <p:cTn id="17" dur="500"/>
+                                        <p:tgtEl>
+                                          <p:spTgt spid="3">
+                                            <p:txEl>
+                                              <p:pRg st="1" end="1"/>
+                                            </p:txEl>
+                                          </p:spTgt>
+                                        </p:tgtEl>
+                                      </p:cBhvr>
+                                    </p:animEffect>
+                                  </p:childTnLst>
+                                </p:cTn>
+                              </p:par>
+                            </p:childTnLst>
+                          </p:cTn>
+                        </p:par>
+                      </p:childTnLst>
+                    </p:cTn>
+                  </p:par>
+                  <p:par>
+                    <p:cTn id="18" fill="hold">
+                      <p:stCondLst>
+                        <p:cond delay="indefinite"/>
+                      </p:stCondLst>
+                      <p:childTnLst>
+                        <p:par>
+                          <p:cTn id="19" fill="hold">
+                            <p:stCondLst>
+                              <p:cond delay="0"/>
+                            </p:stCondLst>
+                            <p:childTnLst>
+                              <p:par>
+                                <p:cTn id="20" presetID="10" presetClass="entr" presetSubtype="0" fill="hold" grpId="0" nodeType="clickEffect">
+                                  <p:stCondLst>
+                                    <p:cond delay="0"/>
+                                  </p:stCondLst>
+                                  <p:childTnLst>
+                                    <p:set>
+                                      <p:cBhvr>
+                                        <p:cTn id="21" dur="1" fill="hold">
+                                          <p:stCondLst>
+                                            <p:cond delay="0"/>
+                                          </p:stCondLst>
+                                        </p:cTn>
+                                        <p:tgtEl>
+                                          <p:spTgt spid="3">
+                                            <p:txEl>
+                                              <p:pRg st="2" end="2"/>
+                                            </p:txEl>
+                                          </p:spTgt>
+                                        </p:tgtEl>
+                                        <p:attrNameLst>
+                                          <p:attrName>style.visibility</p:attrName>
+                                        </p:attrNameLst>
+                                      </p:cBhvr>
+                                      <p:to>
+                                        <p:strVal val="visible"/>
+                                      </p:to>
+                                    </p:set>
+                                    <p:animEffect transition="in" filter="fade">
+                                      <p:cBhvr>
+                                        <p:cTn id="22" dur="500"/>
+                                        <p:tgtEl>
+                                          <p:spTgt spid="3">
+                                            <p:txEl>
+                                              <p:pRg st="2" end="2"/>
+                                            </p:txEl>
+                                          </p:spTgt>
+                                        </p:tgtEl>
+                                      </p:cBhvr>
+                                    </p:animEffect>
+                                  </p:childTnLst>
+                                </p:cTn>
+                              </p:par>
+                            </p:childTnLst>
+                          </p:cTn>
+                        </p:par>
+                      </p:childTnLst>
+                    </p:cTn>
+                  </p:par>
+                  <p:par>
+                    <p:cTn id="23" fill="hold">
+                      <p:stCondLst>
+                        <p:cond delay="indefinite"/>
+                      </p:stCondLst>
+                      <p:childTnLst>
+                        <p:par>
+                          <p:cTn id="24" fill="hold">
+                            <p:stCondLst>
+                              <p:cond delay="0"/>
+                            </p:stCondLst>
+                            <p:childTnLst>
+                              <p:par>
+                                <p:cTn id="25" presetID="10" presetClass="entr" presetSubtype="0" fill="hold" grpId="0" nodeType="clickEffect">
+                                  <p:stCondLst>
+                                    <p:cond delay="0"/>
+                                  </p:stCondLst>
+                                  <p:childTnLst>
+                                    <p:set>
+                                      <p:cBhvr>
+                                        <p:cTn id="26" dur="1" fill="hold">
+                                          <p:stCondLst>
+                                            <p:cond delay="0"/>
+                                          </p:stCondLst>
+                                        </p:cTn>
+                                        <p:tgtEl>
+                                          <p:spTgt spid="3">
+                                            <p:txEl>
+                                              <p:pRg st="3" end="3"/>
+                                            </p:txEl>
+                                          </p:spTgt>
+                                        </p:tgtEl>
+                                        <p:attrNameLst>
+                                          <p:attrName>style.visibility</p:attrName>
+                                        </p:attrNameLst>
+                                      </p:cBhvr>
+                                      <p:to>
+                                        <p:strVal val="visible"/>
+                                      </p:to>
+                                    </p:set>
+                                    <p:animEffect transition="in" filter="fade">
+                                      <p:cBhvr>
+                                        <p:cTn id="27" dur="500"/>
+                                        <p:tgtEl>
+                                          <p:spTgt spid="3">
+                                            <p:txEl>
+                                              <p:pRg st="3" end="3"/>
+                                            </p:txEl>
+                                          </p:spTgt>
+                                        </p:tgtEl>
+                                      </p:cBhvr>
+                                    </p:animEffect>
+                                  </p:childTnLst>
+                                </p:cTn>
+                              </p:par>
+                            </p:childTnLst>
+                          </p:cTn>
+                        </p:par>
+                      </p:childTnLst>
+                    </p:cTn>
+                  </p:par>
+                  <p:par>
+                    <p:cTn id="28" fill="hold">
+                      <p:stCondLst>
+                        <p:cond delay="indefinite"/>
+                      </p:stCondLst>
+                      <p:childTnLst>
+                        <p:par>
+                          <p:cTn id="29" fill="hold">
+                            <p:stCondLst>
+                              <p:cond delay="0"/>
+                            </p:stCondLst>
+                            <p:childTnLst>
+                              <p:par>
+                                <p:cTn id="30" presetID="10" presetClass="entr" presetSubtype="0" fill="hold" grpId="0" nodeType="clickEffect">
+                                  <p:stCondLst>
+                                    <p:cond delay="0"/>
+                                  </p:stCondLst>
+                                  <p:childTnLst>
+                                    <p:set>
+                                      <p:cBhvr>
+                                        <p:cTn id="31" dur="1" fill="hold">
+                                          <p:stCondLst>
+                                            <p:cond delay="0"/>
+                                          </p:stCondLst>
+                                        </p:cTn>
+                                        <p:tgtEl>
+                                          <p:spTgt spid="4"/>
+                                        </p:tgtEl>
+                                        <p:attrNameLst>
+                                          <p:attrName>style.visibility</p:attrName>
+                                        </p:attrNameLst>
+                                      </p:cBhvr>
+                                      <p:to>
+                                        <p:strVal val="visible"/>
+                                      </p:to>
+                                    </p:set>
+                                    <p:animEffect transition="in" filter="fade">
+                                      <p:cBhvr>
+                                        <p:cTn id="32" dur="500"/>
+                                        <p:tgtEl>
+                                          <p:spTgt spid="4"/>
+                                        </p:tgtEl>
+                                      </p:cBhvr>
+                                    </p:animEffect>
+                                  </p:childTnLst>
+                                </p:cTn>
+                              </p:par>
+                            </p:childTnLst>
+                          </p:cTn>
+                        </p:par>
+                      </p:childTnLst>
+                    </p:cTn>
+                  </p:par>
+                </p:childTnLst>
+              </p:cTn>
+              <p:prevCondLst>
+                <p:cond evt="onPrev" delay="0">
+                  <p:tgtEl>
+                    <p:sldTgt/>
+                  </p:tgtEl>
+                </p:cond>
+              </p:prevCondLst>
+              <p:nextCondLst>
+                <p:cond evt="onNext" delay="0">
+                  <p:tgtEl>
+                    <p:sldTgt/>
+                  </p:tgtEl>
+                </p:cond>
+              </p:nextCondLst>
+            </p:seq>
+          </p:childTnLst>
+        </p:cTn>
       </p:par>
     </p:tnLst>
+    <p:bldLst>
+      <p:bldP spid="3" grpId="0" build="p" animBg="1"/>
+      <p:bldP spid="4" grpId="0" animBg="1"/>
+    </p:bldLst>
   </p:timing>
 </p:sld>
 </file>
@@ -6369,7 +7382,12 @@
             <p:ph type="title"/>
           </p:nvPr>
         </p:nvSpPr>
-        <p:spPr/>
+        <p:spPr>
+          <a:xfrm>
+            <a:off x="457200" y="650501"/>
+            <a:ext cx="7135402" cy="862834"/>
+          </a:xfrm>
+        </p:spPr>
         <p:txBody>
           <a:bodyPr>
             <a:normAutofit fontScale="90000"/>
@@ -6377,25 +7395,43 @@
           <a:lstStyle/>
           <a:p>
             <a:r>
-              <a:rPr lang="th-TH" dirty="0"/>
+              <a:rPr lang="th-TH" b="1" dirty="0">
+                <a:latin typeface="TH Sarabun New" pitchFamily="34" charset="-34"/>
+                <a:cs typeface="TH Sarabun New" pitchFamily="34" charset="-34"/>
+              </a:rPr>
               <a:t>ระบบประเมินเป้าหมายยอดขาย </a:t>
             </a:r>
             <a:r>
-              <a:rPr lang="th-TH" dirty="0" smtClean="0"/>
+              <a:rPr lang="th-TH" b="1" dirty="0" smtClean="0">
+                <a:latin typeface="TH Sarabun New" pitchFamily="34" charset="-34"/>
+                <a:cs typeface="TH Sarabun New" pitchFamily="34" charset="-34"/>
+              </a:rPr>
               <a:t/>
             </a:r>
             <a:br>
-              <a:rPr lang="th-TH" dirty="0" smtClean="0"/>
+              <a:rPr lang="th-TH" b="1" dirty="0" smtClean="0">
+                <a:latin typeface="TH Sarabun New" pitchFamily="34" charset="-34"/>
+                <a:cs typeface="TH Sarabun New" pitchFamily="34" charset="-34"/>
+              </a:rPr>
             </a:br>
             <a:r>
-              <a:rPr lang="th-TH" dirty="0" smtClean="0"/>
+              <a:rPr lang="th-TH" b="1" dirty="0" smtClean="0">
+                <a:latin typeface="TH Sarabun New" pitchFamily="34" charset="-34"/>
+                <a:cs typeface="TH Sarabun New" pitchFamily="34" charset="-34"/>
+              </a:rPr>
               <a:t>(</a:t>
             </a:r>
             <a:r>
-              <a:rPr lang="en-US" dirty="0"/>
+              <a:rPr lang="en-US" b="1" dirty="0">
+                <a:latin typeface="TH Sarabun New" pitchFamily="34" charset="-34"/>
+                <a:cs typeface="TH Sarabun New" pitchFamily="34" charset="-34"/>
+              </a:rPr>
               <a:t>Goal Management)</a:t>
             </a:r>
-            <a:endParaRPr lang="th-TH" dirty="0"/>
+            <a:endParaRPr lang="th-TH" b="1" dirty="0">
+              <a:latin typeface="TH Sarabun New" pitchFamily="34" charset="-34"/>
+              <a:cs typeface="TH Sarabun New" pitchFamily="34" charset="-34"/>
+            </a:endParaRPr>
           </a:p>
         </p:txBody>
       </p:sp>
@@ -6411,12 +7447,12 @@
         </p:nvSpPr>
         <p:spPr>
           <a:xfrm>
-            <a:off x="520700" y="2495551"/>
-            <a:ext cx="8229600" cy="1885950"/>
-          </a:xfrm>
-        </p:spPr>
-        <p:txBody>
-          <a:bodyPr>
+            <a:off x="520700" y="2381693"/>
+            <a:ext cx="8229600" cy="1999808"/>
+          </a:xfrm>
+        </p:spPr>
+        <p:txBody>
+          <a:bodyPr anchor="ctr">
             <a:normAutofit/>
           </a:bodyPr>
           <a:lstStyle/>
@@ -6425,18 +7461,30 @@
               <a:buNone/>
             </a:pPr>
             <a:r>
-              <a:rPr lang="th-TH" dirty="0" smtClean="0"/>
-              <a:t>เป็น</a:t>
-            </a:r>
-            <a:r>
-              <a:rPr lang="th-TH" dirty="0"/>
+              <a:rPr lang="th-TH" dirty="0" smtClean="0">
+                <a:latin typeface="TH Sarabun New" pitchFamily="34" charset="-34"/>
+                <a:cs typeface="TH Sarabun New" pitchFamily="34" charset="-34"/>
+              </a:rPr>
+              <a:t>	เป็น</a:t>
+            </a:r>
+            <a:r>
+              <a:rPr lang="th-TH" dirty="0">
+                <a:latin typeface="TH Sarabun New" pitchFamily="34" charset="-34"/>
+                <a:cs typeface="TH Sarabun New" pitchFamily="34" charset="-34"/>
+              </a:rPr>
               <a:t>ระบบที่ผู้บริหารสามารถตั้งเป้าหมายให้พนักงานแต่ละบุคคล รวมทั้งสามารถประเมินเป้าหมายยอดขายต่างๆ ได้ โดยเบื้องต้นผู้บริหารต้องการให้ระบบสามารถตั้งเป้าหมายของแต่ละ</a:t>
             </a:r>
             <a:r>
-              <a:rPr lang="th-TH" dirty="0" smtClean="0"/>
+              <a:rPr lang="th-TH" dirty="0" smtClean="0">
+                <a:latin typeface="TH Sarabun New" pitchFamily="34" charset="-34"/>
+                <a:cs typeface="TH Sarabun New" pitchFamily="34" charset="-34"/>
+              </a:rPr>
               <a:t>หน้าที่</a:t>
             </a:r>
-            <a:endParaRPr lang="th-TH" b="1" dirty="0"/>
+            <a:endParaRPr lang="th-TH" b="1" dirty="0">
+              <a:latin typeface="TH Sarabun New" pitchFamily="34" charset="-34"/>
+              <a:cs typeface="TH Sarabun New" pitchFamily="34" charset="-34"/>
+            </a:endParaRPr>
           </a:p>
         </p:txBody>
       </p:sp>
@@ -6487,20 +7535,34 @@
             <p:ph type="title"/>
           </p:nvPr>
         </p:nvSpPr>
-        <p:spPr/>
+        <p:spPr>
+          <a:xfrm>
+            <a:off x="2990850" y="1375541"/>
+            <a:ext cx="3019425" cy="862834"/>
+          </a:xfrm>
+        </p:spPr>
         <p:txBody>
           <a:bodyPr/>
           <a:lstStyle/>
           <a:p>
             <a:r>
-              <a:rPr lang="th-TH" dirty="0"/>
-              <a:t>กลุ่ม </a:t>
-            </a:r>
-            <a:r>
-              <a:rPr lang="en-US" dirty="0"/>
+              <a:rPr lang="th-TH" b="1" dirty="0" smtClean="0">
+                <a:latin typeface="TH Sarabun New" pitchFamily="34" charset="-34"/>
+                <a:cs typeface="TH Sarabun New" pitchFamily="34" charset="-34"/>
+              </a:rPr>
+              <a:t>สมาชิกกลุ่ม </a:t>
+            </a:r>
+            <a:r>
+              <a:rPr lang="en-US" b="1" dirty="0">
+                <a:latin typeface="TH Sarabun New" pitchFamily="34" charset="-34"/>
+                <a:cs typeface="TH Sarabun New" pitchFamily="34" charset="-34"/>
+              </a:rPr>
               <a:t>6</a:t>
             </a:r>
-            <a:endParaRPr lang="th-TH" dirty="0"/>
+            <a:endParaRPr lang="th-TH" b="1" dirty="0">
+              <a:latin typeface="TH Sarabun New" pitchFamily="34" charset="-34"/>
+              <a:cs typeface="TH Sarabun New" pitchFamily="34" charset="-34"/>
+            </a:endParaRPr>
           </a:p>
         </p:txBody>
       </p:sp>
@@ -6514,142 +7576,242 @@
             <p:ph idx="1"/>
           </p:nvPr>
         </p:nvSpPr>
-        <p:spPr/>
-        <p:txBody>
-          <a:bodyPr/>
+        <p:spPr>
+          <a:xfrm>
+            <a:off x="2952750" y="2514600"/>
+            <a:ext cx="5895975" cy="2943225"/>
+          </a:xfrm>
+        </p:spPr>
+        <p:txBody>
+          <a:bodyPr>
+            <a:normAutofit/>
+          </a:bodyPr>
           <a:lstStyle/>
           <a:p>
             <a:pPr marL="0" indent="0">
               <a:buNone/>
             </a:pPr>
             <a:r>
-              <a:rPr lang="en-US" dirty="0"/>
+              <a:rPr lang="en-US" b="1" dirty="0">
+                <a:latin typeface="TH Sarabun New" pitchFamily="34" charset="-34"/>
+                <a:cs typeface="TH Sarabun New" pitchFamily="34" charset="-34"/>
+              </a:rPr>
               <a:t>587 09085 21	</a:t>
             </a:r>
             <a:r>
-              <a:rPr lang="th-TH" dirty="0" smtClean="0"/>
+              <a:rPr lang="th-TH" b="1" dirty="0" smtClean="0">
+                <a:latin typeface="TH Sarabun New" pitchFamily="34" charset="-34"/>
+                <a:cs typeface="TH Sarabun New" pitchFamily="34" charset="-34"/>
+              </a:rPr>
               <a:t>	นาย</a:t>
             </a:r>
             <a:r>
-              <a:rPr lang="th-TH" dirty="0"/>
+              <a:rPr lang="th-TH" b="1" dirty="0">
+                <a:latin typeface="TH Sarabun New" pitchFamily="34" charset="-34"/>
+                <a:cs typeface="TH Sarabun New" pitchFamily="34" charset="-34"/>
+              </a:rPr>
               <a:t>คทาธิป	พานิช</a:t>
             </a:r>
-            <a:endParaRPr lang="en-US" dirty="0"/>
+            <a:endParaRPr lang="en-US" b="1" dirty="0">
+              <a:latin typeface="TH Sarabun New" pitchFamily="34" charset="-34"/>
+              <a:cs typeface="TH Sarabun New" pitchFamily="34" charset="-34"/>
+            </a:endParaRPr>
           </a:p>
           <a:p>
             <a:pPr marL="0" indent="0">
               <a:buNone/>
             </a:pPr>
             <a:r>
-              <a:rPr lang="en-US" dirty="0"/>
+              <a:rPr lang="en-US" b="1" dirty="0">
+                <a:latin typeface="TH Sarabun New" pitchFamily="34" charset="-34"/>
+                <a:cs typeface="TH Sarabun New" pitchFamily="34" charset="-34"/>
+              </a:rPr>
               <a:t>587 09188 </a:t>
             </a:r>
             <a:r>
-              <a:rPr lang="en-US" dirty="0" smtClean="0"/>
+              <a:rPr lang="en-US" b="1" dirty="0" smtClean="0">
+                <a:latin typeface="TH Sarabun New" pitchFamily="34" charset="-34"/>
+                <a:cs typeface="TH Sarabun New" pitchFamily="34" charset="-34"/>
+              </a:rPr>
               <a:t>21	</a:t>
             </a:r>
             <a:r>
-              <a:rPr lang="en-US" dirty="0"/>
+              <a:rPr lang="en-US" b="1" dirty="0">
+                <a:latin typeface="TH Sarabun New" pitchFamily="34" charset="-34"/>
+                <a:cs typeface="TH Sarabun New" pitchFamily="34" charset="-34"/>
+              </a:rPr>
               <a:t>	</a:t>
             </a:r>
             <a:r>
-              <a:rPr lang="th-TH" dirty="0"/>
+              <a:rPr lang="th-TH" b="1" dirty="0">
+                <a:latin typeface="TH Sarabun New" pitchFamily="34" charset="-34"/>
+                <a:cs typeface="TH Sarabun New" pitchFamily="34" charset="-34"/>
+              </a:rPr>
               <a:t>นายปฤษฎี	</a:t>
             </a:r>
             <a:r>
-              <a:rPr lang="th-TH" dirty="0" smtClean="0"/>
+              <a:rPr lang="th-TH" b="1" dirty="0" smtClean="0">
+                <a:latin typeface="TH Sarabun New" pitchFamily="34" charset="-34"/>
+                <a:cs typeface="TH Sarabun New" pitchFamily="34" charset="-34"/>
+              </a:rPr>
               <a:t>ท่า</a:t>
             </a:r>
             <a:r>
-              <a:rPr lang="th-TH" dirty="0"/>
+              <a:rPr lang="th-TH" b="1" dirty="0">
+                <a:latin typeface="TH Sarabun New" pitchFamily="34" charset="-34"/>
+                <a:cs typeface="TH Sarabun New" pitchFamily="34" charset="-34"/>
+              </a:rPr>
               <a:t>ดีสม</a:t>
             </a:r>
-            <a:endParaRPr lang="en-US" dirty="0"/>
+            <a:endParaRPr lang="en-US" b="1" dirty="0">
+              <a:latin typeface="TH Sarabun New" pitchFamily="34" charset="-34"/>
+              <a:cs typeface="TH Sarabun New" pitchFamily="34" charset="-34"/>
+            </a:endParaRPr>
           </a:p>
           <a:p>
             <a:pPr marL="0" indent="0">
               <a:buNone/>
             </a:pPr>
             <a:r>
-              <a:rPr lang="en-US" dirty="0"/>
+              <a:rPr lang="en-US" b="1" dirty="0">
+                <a:latin typeface="TH Sarabun New" pitchFamily="34" charset="-34"/>
+                <a:cs typeface="TH Sarabun New" pitchFamily="34" charset="-34"/>
+              </a:rPr>
               <a:t>587 09470 21	</a:t>
             </a:r>
             <a:r>
-              <a:rPr lang="th-TH" dirty="0" smtClean="0"/>
+              <a:rPr lang="th-TH" b="1" dirty="0" smtClean="0">
+                <a:latin typeface="TH Sarabun New" pitchFamily="34" charset="-34"/>
+                <a:cs typeface="TH Sarabun New" pitchFamily="34" charset="-34"/>
+              </a:rPr>
               <a:t>	นางสาว</a:t>
             </a:r>
             <a:r>
-              <a:rPr lang="th-TH" dirty="0"/>
+              <a:rPr lang="th-TH" b="1" dirty="0">
+                <a:latin typeface="TH Sarabun New" pitchFamily="34" charset="-34"/>
+                <a:cs typeface="TH Sarabun New" pitchFamily="34" charset="-34"/>
+              </a:rPr>
               <a:t>ปาริชาติ</a:t>
             </a:r>
             <a:r>
-              <a:rPr lang="en-US" dirty="0"/>
+              <a:rPr lang="en-US" b="1" dirty="0">
+                <a:latin typeface="TH Sarabun New" pitchFamily="34" charset="-34"/>
+                <a:cs typeface="TH Sarabun New" pitchFamily="34" charset="-34"/>
+              </a:rPr>
               <a:t>	</a:t>
             </a:r>
             <a:r>
-              <a:rPr lang="th-TH" dirty="0"/>
+              <a:rPr lang="th-TH" b="1" dirty="0">
+                <a:latin typeface="TH Sarabun New" pitchFamily="34" charset="-34"/>
+                <a:cs typeface="TH Sarabun New" pitchFamily="34" charset="-34"/>
+              </a:rPr>
               <a:t> </a:t>
             </a:r>
             <a:r>
-              <a:rPr lang="th-TH" dirty="0" smtClean="0"/>
+              <a:rPr lang="th-TH" b="1" dirty="0" smtClean="0">
+                <a:latin typeface="TH Sarabun New" pitchFamily="34" charset="-34"/>
+                <a:cs typeface="TH Sarabun New" pitchFamily="34" charset="-34"/>
+              </a:rPr>
               <a:t> เกียรติ</a:t>
             </a:r>
             <a:r>
-              <a:rPr lang="th-TH" dirty="0"/>
+              <a:rPr lang="th-TH" b="1" dirty="0">
+                <a:latin typeface="TH Sarabun New" pitchFamily="34" charset="-34"/>
+                <a:cs typeface="TH Sarabun New" pitchFamily="34" charset="-34"/>
+              </a:rPr>
               <a:t>เผ่า</a:t>
             </a:r>
-            <a:endParaRPr lang="en-US" dirty="0"/>
+            <a:endParaRPr lang="en-US" b="1" dirty="0">
+              <a:latin typeface="TH Sarabun New" pitchFamily="34" charset="-34"/>
+              <a:cs typeface="TH Sarabun New" pitchFamily="34" charset="-34"/>
+            </a:endParaRPr>
           </a:p>
           <a:p>
             <a:pPr marL="0" indent="0">
               <a:buNone/>
             </a:pPr>
             <a:r>
-              <a:rPr lang="en-US" dirty="0"/>
+              <a:rPr lang="en-US" b="1" dirty="0">
+                <a:latin typeface="TH Sarabun New" pitchFamily="34" charset="-34"/>
+                <a:cs typeface="TH Sarabun New" pitchFamily="34" charset="-34"/>
+              </a:rPr>
               <a:t>587 09537 21	</a:t>
             </a:r>
             <a:r>
-              <a:rPr lang="th-TH" dirty="0" smtClean="0"/>
+              <a:rPr lang="th-TH" b="1" dirty="0" smtClean="0">
+                <a:latin typeface="TH Sarabun New" pitchFamily="34" charset="-34"/>
+                <a:cs typeface="TH Sarabun New" pitchFamily="34" charset="-34"/>
+              </a:rPr>
               <a:t>	นาย</a:t>
             </a:r>
             <a:r>
-              <a:rPr lang="th-TH" dirty="0"/>
+              <a:rPr lang="th-TH" b="1" dirty="0">
+                <a:latin typeface="TH Sarabun New" pitchFamily="34" charset="-34"/>
+                <a:cs typeface="TH Sarabun New" pitchFamily="34" charset="-34"/>
+              </a:rPr>
               <a:t>ภาคภูมิ </a:t>
             </a:r>
             <a:r>
-              <a:rPr lang="th-TH" dirty="0" smtClean="0"/>
+              <a:rPr lang="th-TH" b="1" dirty="0" smtClean="0">
+                <a:latin typeface="TH Sarabun New" pitchFamily="34" charset="-34"/>
+                <a:cs typeface="TH Sarabun New" pitchFamily="34" charset="-34"/>
+              </a:rPr>
               <a:t> แสง</a:t>
             </a:r>
             <a:r>
-              <a:rPr lang="th-TH" dirty="0"/>
+              <a:rPr lang="th-TH" b="1" dirty="0">
+                <a:latin typeface="TH Sarabun New" pitchFamily="34" charset="-34"/>
+                <a:cs typeface="TH Sarabun New" pitchFamily="34" charset="-34"/>
+              </a:rPr>
               <a:t>ประสิทธิโชค</a:t>
             </a:r>
-            <a:endParaRPr lang="en-US" dirty="0"/>
+            <a:endParaRPr lang="en-US" b="1" dirty="0">
+              <a:latin typeface="TH Sarabun New" pitchFamily="34" charset="-34"/>
+              <a:cs typeface="TH Sarabun New" pitchFamily="34" charset="-34"/>
+            </a:endParaRPr>
           </a:p>
           <a:p>
             <a:pPr marL="0" indent="0">
               <a:buNone/>
             </a:pPr>
             <a:r>
-              <a:rPr lang="en-US" dirty="0"/>
+              <a:rPr lang="en-US" b="1" dirty="0">
+                <a:latin typeface="TH Sarabun New" pitchFamily="34" charset="-34"/>
+                <a:cs typeface="TH Sarabun New" pitchFamily="34" charset="-34"/>
+              </a:rPr>
               <a:t>587 09761 </a:t>
             </a:r>
             <a:r>
-              <a:rPr lang="en-US" dirty="0" smtClean="0"/>
+              <a:rPr lang="en-US" b="1" dirty="0" smtClean="0">
+                <a:latin typeface="TH Sarabun New" pitchFamily="34" charset="-34"/>
+                <a:cs typeface="TH Sarabun New" pitchFamily="34" charset="-34"/>
+              </a:rPr>
               <a:t>21	</a:t>
             </a:r>
             <a:r>
-              <a:rPr lang="en-US" dirty="0"/>
+              <a:rPr lang="en-US" b="1" dirty="0">
+                <a:latin typeface="TH Sarabun New" pitchFamily="34" charset="-34"/>
+                <a:cs typeface="TH Sarabun New" pitchFamily="34" charset="-34"/>
+              </a:rPr>
               <a:t>	</a:t>
             </a:r>
             <a:r>
-              <a:rPr lang="th-TH" dirty="0"/>
+              <a:rPr lang="th-TH" b="1" dirty="0">
+                <a:latin typeface="TH Sarabun New" pitchFamily="34" charset="-34"/>
+                <a:cs typeface="TH Sarabun New" pitchFamily="34" charset="-34"/>
+              </a:rPr>
               <a:t>นางสาวสุพัตรา	อินศรี</a:t>
             </a:r>
-            <a:endParaRPr lang="en-US" dirty="0"/>
-          </a:p>
-          <a:p>
-            <a:endParaRPr lang="th-TH" dirty="0"/>
+            <a:endParaRPr lang="en-US" b="1" dirty="0">
+              <a:latin typeface="TH Sarabun New" pitchFamily="34" charset="-34"/>
+              <a:cs typeface="TH Sarabun New" pitchFamily="34" charset="-34"/>
+            </a:endParaRPr>
+          </a:p>
+          <a:p>
+            <a:endParaRPr lang="th-TH" b="1" dirty="0">
+              <a:latin typeface="TH Sarabun New" pitchFamily="34" charset="-34"/>
+              <a:cs typeface="TH Sarabun New" pitchFamily="34" charset="-34"/>
+            </a:endParaRPr>
           </a:p>
         </p:txBody>
       </p:sp>
@@ -6755,6 +7917,13 @@
   <p:clrMapOvr>
     <a:masterClrMapping/>
   </p:clrMapOvr>
+  <p:timing>
+    <p:tnLst>
+      <p:par>
+        <p:cTn id="1" dur="indefinite" restart="never" nodeType="tmRoot"/>
+      </p:par>
+    </p:tnLst>
+  </p:timing>
 </p:sld>
 </file>
 
@@ -7584,7 +8753,6 @@
               <a:rPr lang="th-TH" sz="2000" dirty="0" smtClean="0"/>
               <a:t>ระบบออกรายงาน</a:t>
             </a:r>
-            <a:endParaRPr lang="th-TH" sz="2000" dirty="0" smtClean="0"/>
           </a:p>
         </p:txBody>
       </p:sp>
@@ -7659,7 +8827,6 @@
               <a:rPr lang="th-TH" sz="2000" dirty="0" smtClean="0"/>
               <a:t>ช่วงเริ่มต้นการพัฒนาระบบ</a:t>
             </a:r>
-            <a:endParaRPr lang="th-TH" sz="2000" dirty="0" smtClean="0"/>
           </a:p>
         </p:txBody>
       </p:sp>
@@ -7993,7 +9160,6 @@
               <a:rPr lang="en-US" sz="2400" dirty="0"/>
               <a:t> (User Authentication) </a:t>
             </a:r>
-            <a:endParaRPr lang="en-US" sz="2400" dirty="0"/>
           </a:p>
           <a:p>
             <a:pPr marL="0" indent="0">
@@ -8148,7 +9314,6 @@
               <a:rPr lang="th-TH" b="1" dirty="0" smtClean="0"/>
               <a:t>สิ่งที่พัฒนา</a:t>
             </a:r>
-            <a:endParaRPr lang="th-TH" b="1" dirty="0" smtClean="0"/>
           </a:p>
           <a:p>
             <a:pPr lvl="1" indent="-342900">
@@ -8314,7 +9479,6 @@
               <a:rPr lang="th-TH" b="1" dirty="0" smtClean="0"/>
               <a:t>สิ่งที่พัฒนา</a:t>
             </a:r>
-            <a:endParaRPr lang="th-TH" b="1" dirty="0" smtClean="0"/>
           </a:p>
           <a:p>
             <a:pPr marL="857250" lvl="1" indent="-457200">
@@ -8460,67 +9624,96 @@
         </p:nvSpPr>
         <p:spPr/>
         <p:txBody>
+          <a:bodyPr>
+            <a:normAutofit/>
+          </a:bodyPr>
+          <a:lstStyle/>
+          <a:p>
+            <a:r>
+              <a:rPr lang="en-US" sz="4000" b="1" dirty="0" smtClean="0">
+                <a:latin typeface="TH Sarabun New" pitchFamily="34" charset="-34"/>
+                <a:cs typeface="TH Sarabun New" pitchFamily="34" charset="-34"/>
+              </a:rPr>
+              <a:t>Outline</a:t>
+            </a:r>
+            <a:endParaRPr lang="en-US" sz="4000" b="1" dirty="0">
+              <a:latin typeface="TH Sarabun New" pitchFamily="34" charset="-34"/>
+              <a:cs typeface="TH Sarabun New" pitchFamily="34" charset="-34"/>
+            </a:endParaRPr>
+          </a:p>
+        </p:txBody>
+      </p:sp>
+      <p:sp>
+        <p:nvSpPr>
+          <p:cNvPr id="3" name="Content Placeholder 2"/>
+          <p:cNvSpPr>
+            <a:spLocks noGrp="1"/>
+          </p:cNvSpPr>
+          <p:nvPr>
+            <p:ph idx="1"/>
+          </p:nvPr>
+        </p:nvSpPr>
+        <p:spPr/>
+        <p:txBody>
           <a:bodyPr/>
           <a:lstStyle/>
           <a:p>
             <a:r>
-              <a:rPr lang="en-US" dirty="0" smtClean="0"/>
-              <a:t>Outline</a:t>
-            </a:r>
-            <a:endParaRPr lang="en-US" dirty="0"/>
-          </a:p>
-        </p:txBody>
-      </p:sp>
-      <p:sp>
-        <p:nvSpPr>
-          <p:cNvPr id="3" name="Content Placeholder 2"/>
-          <p:cNvSpPr>
-            <a:spLocks noGrp="1"/>
-          </p:cNvSpPr>
-          <p:nvPr>
-            <p:ph idx="1"/>
-          </p:nvPr>
-        </p:nvSpPr>
-        <p:spPr/>
-        <p:txBody>
-          <a:bodyPr/>
-          <a:lstStyle/>
-          <a:p>
-            <a:r>
-              <a:rPr lang="th-TH" dirty="0" smtClean="0"/>
+              <a:rPr lang="th-TH" dirty="0" smtClean="0">
+                <a:latin typeface="TH Sarabun New" pitchFamily="34" charset="-34"/>
+                <a:cs typeface="TH Sarabun New" pitchFamily="34" charset="-34"/>
+              </a:rPr>
               <a:t>ที่มาและปัญหาของระบบ</a:t>
             </a:r>
           </a:p>
           <a:p>
             <a:r>
-              <a:rPr lang="th-TH" dirty="0" smtClean="0"/>
+              <a:rPr lang="th-TH" dirty="0" smtClean="0">
+                <a:latin typeface="TH Sarabun New" pitchFamily="34" charset="-34"/>
+                <a:cs typeface="TH Sarabun New" pitchFamily="34" charset="-34"/>
+              </a:rPr>
               <a:t>ภาพรวมระบบใหม่</a:t>
             </a:r>
           </a:p>
           <a:p>
             <a:r>
-              <a:rPr lang="th-TH" dirty="0" smtClean="0"/>
+              <a:rPr lang="th-TH" dirty="0" smtClean="0">
+                <a:latin typeface="TH Sarabun New" pitchFamily="34" charset="-34"/>
+                <a:cs typeface="TH Sarabun New" pitchFamily="34" charset="-34"/>
+              </a:rPr>
               <a:t>วิธีการพัฒนา</a:t>
             </a:r>
           </a:p>
           <a:p>
             <a:r>
-              <a:rPr lang="th-TH" dirty="0" smtClean="0"/>
+              <a:rPr lang="th-TH" dirty="0" smtClean="0">
+                <a:latin typeface="TH Sarabun New" pitchFamily="34" charset="-34"/>
+                <a:cs typeface="TH Sarabun New" pitchFamily="34" charset="-34"/>
+              </a:rPr>
               <a:t>แนวทางในการพัฒนาระบบใหม่</a:t>
             </a:r>
           </a:p>
           <a:p>
             <a:r>
-              <a:rPr lang="th-TH" dirty="0" smtClean="0"/>
+              <a:rPr lang="th-TH" dirty="0" smtClean="0">
+                <a:latin typeface="TH Sarabun New" pitchFamily="34" charset="-34"/>
+                <a:cs typeface="TH Sarabun New" pitchFamily="34" charset="-34"/>
+              </a:rPr>
               <a:t>ผลการศึกษาความเป็นไปได้และความเสี่ยง</a:t>
             </a:r>
           </a:p>
           <a:p>
             <a:r>
-              <a:rPr lang="th-TH" dirty="0" smtClean="0"/>
+              <a:rPr lang="th-TH" dirty="0" smtClean="0">
+                <a:latin typeface="TH Sarabun New" pitchFamily="34" charset="-34"/>
+                <a:cs typeface="TH Sarabun New" pitchFamily="34" charset="-34"/>
+              </a:rPr>
               <a:t>แผนการพัฒนาระบบใหม่</a:t>
             </a:r>
-            <a:endParaRPr lang="en-US" dirty="0"/>
+            <a:endParaRPr lang="en-US" dirty="0">
+              <a:latin typeface="TH Sarabun New" pitchFamily="34" charset="-34"/>
+              <a:cs typeface="TH Sarabun New" pitchFamily="34" charset="-34"/>
+            </a:endParaRPr>
           </a:p>
         </p:txBody>
       </p:sp>
@@ -8620,7 +9813,6 @@
               <a:rPr lang="th-TH" b="1" dirty="0" smtClean="0"/>
               <a:t>สิ่งที่พัฒนา</a:t>
             </a:r>
-            <a:endParaRPr lang="th-TH" b="1" dirty="0" smtClean="0"/>
           </a:p>
           <a:p>
             <a:pPr lvl="1" indent="-342900">
@@ -10206,6 +11398,48 @@
           <a:chExt cx="0" cy="0"/>
         </a:xfrm>
       </p:grpSpPr>
+      <p:pic>
+        <p:nvPicPr>
+          <p:cNvPr id="1026" name="Picture 2" descr="http://www.westernseminary.edu/transformedblog/wp-content/uploads/2011/11/repairmen.jpg"/>
+          <p:cNvPicPr>
+            <a:picLocks noChangeAspect="1" noChangeArrowheads="1"/>
+          </p:cNvPicPr>
+          <p:nvPr/>
+        </p:nvPicPr>
+        <p:blipFill>
+          <a:blip r:embed="rId2">
+            <a:lum bright="70000" contrast="-70000"/>
+            <a:extLst>
+              <a:ext uri="{28A0092B-C50C-407E-A947-70E740481C1C}">
+                <a14:useLocalDpi xmlns:a14="http://schemas.microsoft.com/office/drawing/2010/main" val="0"/>
+              </a:ext>
+            </a:extLst>
+          </a:blip>
+          <a:srcRect/>
+          <a:stretch>
+            <a:fillRect/>
+          </a:stretch>
+        </p:blipFill>
+        <p:spPr bwMode="auto">
+          <a:xfrm>
+            <a:off x="4291960" y="1885950"/>
+            <a:ext cx="4202753" cy="2914650"/>
+          </a:xfrm>
+          <a:prstGeom prst="rect">
+            <a:avLst/>
+          </a:prstGeom>
+          <a:noFill/>
+          <a:extLst>
+            <a:ext uri="{909E8E84-426E-40DD-AFC4-6F175D3DCCD1}">
+              <a14:hiddenFill xmlns:a14="http://schemas.microsoft.com/office/drawing/2010/main">
+                <a:solidFill>
+                  <a:srgbClr val="FFFFFF"/>
+                </a:solidFill>
+              </a14:hiddenFill>
+            </a:ext>
+          </a:extLst>
+        </p:spPr>
+      </p:pic>
       <p:sp>
         <p:nvSpPr>
           <p:cNvPr id="2" name="ชื่อเรื่อง 1"/>
@@ -10218,49 +11452,37 @@
         </p:nvSpPr>
         <p:spPr>
           <a:xfrm>
-            <a:off x="2787161" y="4406900"/>
-            <a:ext cx="5707551" cy="1362075"/>
-          </a:xfrm>
-        </p:spPr>
-        <p:txBody>
-          <a:bodyPr/>
+            <a:off x="722313" y="4511676"/>
+            <a:ext cx="7772400" cy="1362075"/>
+          </a:xfrm>
+        </p:spPr>
+        <p:txBody>
+          <a:bodyPr>
+            <a:normAutofit/>
+          </a:bodyPr>
           <a:lstStyle/>
           <a:p>
-            <a:r>
-              <a:rPr lang="th-TH" dirty="0" smtClean="0">
+            <a:pPr algn="r"/>
+            <a:r>
+              <a:rPr lang="th-TH" sz="4400" dirty="0" smtClean="0">
                 <a:solidFill>
                   <a:srgbClr val="C00000"/>
                 </a:solidFill>
+                <a:latin typeface="TH Sarabun New" pitchFamily="34" charset="-34"/>
+                <a:cs typeface="TH Sarabun New" pitchFamily="34" charset="-34"/>
               </a:rPr>
               <a:t>ที่มา</a:t>
             </a:r>
             <a:r>
-              <a:rPr lang="th-TH" dirty="0">
+              <a:rPr lang="th-TH" sz="4400" dirty="0">
                 <a:solidFill>
                   <a:srgbClr val="C00000"/>
                 </a:solidFill>
+                <a:latin typeface="TH Sarabun New" pitchFamily="34" charset="-34"/>
+                <a:cs typeface="TH Sarabun New" pitchFamily="34" charset="-34"/>
               </a:rPr>
               <a:t>และปัญหาของระบบปัจจุบัน</a:t>
             </a:r>
-          </a:p>
-        </p:txBody>
-      </p:sp>
-      <p:sp>
-        <p:nvSpPr>
-          <p:cNvPr id="3" name="ตัวแทนข้อความ 2"/>
-          <p:cNvSpPr>
-            <a:spLocks noGrp="1"/>
-          </p:cNvSpPr>
-          <p:nvPr>
-            <p:ph type="body" idx="1"/>
-          </p:nvPr>
-        </p:nvSpPr>
-        <p:spPr/>
-        <p:txBody>
-          <a:bodyPr/>
-          <a:lstStyle/>
-          <a:p>
-            <a:endParaRPr lang="th-TH"/>
           </a:p>
         </p:txBody>
       </p:sp>
@@ -10274,6 +11496,13 @@
   <p:clrMapOvr>
     <a:masterClrMapping/>
   </p:clrMapOvr>
+  <p:timing>
+    <p:tnLst>
+      <p:par>
+        <p:cTn id="1" dur="indefinite" restart="never" nodeType="tmRoot"/>
+      </p:par>
+    </p:tnLst>
+  </p:timing>
 </p:sld>
 </file>
 
@@ -10294,6 +11523,96 @@
           <a:chExt cx="0" cy="0"/>
         </a:xfrm>
       </p:grpSpPr>
+      <p:pic>
+        <p:nvPicPr>
+          <p:cNvPr id="5" name="Picture 4"/>
+          <p:cNvPicPr>
+            <a:picLocks noChangeAspect="1"/>
+          </p:cNvPicPr>
+          <p:nvPr/>
+        </p:nvPicPr>
+        <p:blipFill>
+          <a:blip r:embed="rId2">
+            <a:extLst>
+              <a:ext uri="{BEBA8EAE-BF5A-486C-A8C5-ECC9F3942E4B}">
+                <a14:imgProps xmlns:a14="http://schemas.microsoft.com/office/drawing/2010/main">
+                  <a14:imgLayer r:embed="rId3">
+                    <a14:imgEffect>
+                      <a14:saturation sat="66000"/>
+                    </a14:imgEffect>
+                    <a14:imgEffect>
+                      <a14:brightnessContrast bright="20000"/>
+                    </a14:imgEffect>
+                  </a14:imgLayer>
+                </a14:imgProps>
+              </a:ext>
+              <a:ext uri="{28A0092B-C50C-407E-A947-70E740481C1C}">
+                <a14:useLocalDpi xmlns:a14="http://schemas.microsoft.com/office/drawing/2010/main" val="0"/>
+              </a:ext>
+            </a:extLst>
+          </a:blip>
+          <a:stretch>
+            <a:fillRect/>
+          </a:stretch>
+        </p:blipFill>
+        <p:spPr>
+          <a:xfrm>
+            <a:off x="4744526" y="1619930"/>
+            <a:ext cx="3654200" cy="2436133"/>
+          </a:xfrm>
+          <a:prstGeom prst="rect">
+            <a:avLst/>
+          </a:prstGeom>
+          <a:effectLst>
+            <a:reflection blurRad="6350" stA="52000" endA="300" endPos="35000" dir="5400000" sy="-100000" algn="bl" rotWithShape="0"/>
+          </a:effectLst>
+        </p:spPr>
+      </p:pic>
+      <p:pic>
+        <p:nvPicPr>
+          <p:cNvPr id="4" name="Picture 3"/>
+          <p:cNvPicPr>
+            <a:picLocks noChangeAspect="1"/>
+          </p:cNvPicPr>
+          <p:nvPr/>
+        </p:nvPicPr>
+        <p:blipFill>
+          <a:blip r:embed="rId4">
+            <a:extLst>
+              <a:ext uri="{BEBA8EAE-BF5A-486C-A8C5-ECC9F3942E4B}">
+                <a14:imgProps xmlns:a14="http://schemas.microsoft.com/office/drawing/2010/main">
+                  <a14:imgLayer r:embed="rId5">
+                    <a14:imgEffect>
+                      <a14:saturation sat="66000"/>
+                    </a14:imgEffect>
+                    <a14:imgEffect>
+                      <a14:brightnessContrast bright="40000" contrast="-20000"/>
+                    </a14:imgEffect>
+                  </a14:imgLayer>
+                </a14:imgProps>
+              </a:ext>
+              <a:ext uri="{28A0092B-C50C-407E-A947-70E740481C1C}">
+                <a14:useLocalDpi xmlns:a14="http://schemas.microsoft.com/office/drawing/2010/main" val="0"/>
+              </a:ext>
+            </a:extLst>
+          </a:blip>
+          <a:stretch>
+            <a:fillRect/>
+          </a:stretch>
+        </p:blipFill>
+        <p:spPr>
+          <a:xfrm>
+            <a:off x="457200" y="1601788"/>
+            <a:ext cx="4287326" cy="2447925"/>
+          </a:xfrm>
+          <a:prstGeom prst="rect">
+            <a:avLst/>
+          </a:prstGeom>
+          <a:effectLst>
+            <a:reflection blurRad="6350" stA="52000" endA="300" endPos="35000" dir="5400000" sy="-100000" algn="bl" rotWithShape="0"/>
+          </a:effectLst>
+        </p:spPr>
+      </p:pic>
       <p:sp>
         <p:nvSpPr>
           <p:cNvPr id="2" name="ชื่อเรื่อง 1"/>
@@ -10306,14 +11625,22 @@
         </p:nvSpPr>
         <p:spPr/>
         <p:txBody>
-          <a:bodyPr/>
+          <a:bodyPr>
+            <a:normAutofit/>
+          </a:bodyPr>
           <a:lstStyle/>
           <a:p>
             <a:r>
-              <a:rPr lang="en-US" dirty="0" smtClean="0"/>
+              <a:rPr lang="en-US" sz="4000" b="1" dirty="0" smtClean="0">
+                <a:latin typeface="TH Sarabun New" pitchFamily="34" charset="-34"/>
+                <a:cs typeface="TH Sarabun New" pitchFamily="34" charset="-34"/>
+              </a:rPr>
               <a:t>Triple B Fitness Center</a:t>
             </a:r>
-            <a:endParaRPr lang="th-TH" dirty="0"/>
+            <a:endParaRPr lang="th-TH" sz="4000" b="1" dirty="0">
+              <a:latin typeface="TH Sarabun New" pitchFamily="34" charset="-34"/>
+              <a:cs typeface="TH Sarabun New" pitchFamily="34" charset="-34"/>
+            </a:endParaRPr>
           </a:p>
         </p:txBody>
       </p:sp>
@@ -10327,12 +11654,172 @@
             <p:ph idx="1"/>
           </p:nvPr>
         </p:nvSpPr>
-        <p:spPr/>
-        <p:txBody>
-          <a:bodyPr/>
+        <p:spPr>
+          <a:xfrm>
+            <a:off x="381001" y="4057650"/>
+            <a:ext cx="8096250" cy="2152650"/>
+          </a:xfrm>
+        </p:spPr>
+        <p:txBody>
+          <a:bodyPr>
+            <a:normAutofit fontScale="92500" lnSpcReduction="10000"/>
+          </a:bodyPr>
           <a:lstStyle/>
           <a:p>
-            <a:endParaRPr lang="th-TH" dirty="0"/>
+            <a:pPr marL="0" indent="0" algn="thaiDist">
+              <a:buNone/>
+            </a:pPr>
+            <a:r>
+              <a:rPr lang="th-TH" dirty="0" smtClean="0">
+                <a:latin typeface="TH Sarabun New" pitchFamily="34" charset="-34"/>
+                <a:cs typeface="TH Sarabun New" pitchFamily="34" charset="-34"/>
+              </a:rPr>
+              <a:t>	</a:t>
+            </a:r>
+            <a:r>
+              <a:rPr lang="th-TH" b="1" dirty="0" err="1">
+                <a:latin typeface="TH Sarabun New" pitchFamily="34" charset="-34"/>
+                <a:cs typeface="TH Sarabun New" pitchFamily="34" charset="-34"/>
+              </a:rPr>
+              <a:t>ทริปเปิล</a:t>
+            </a:r>
+            <a:r>
+              <a:rPr lang="th-TH" b="1" dirty="0">
+                <a:latin typeface="TH Sarabun New" pitchFamily="34" charset="-34"/>
+                <a:cs typeface="TH Sarabun New" pitchFamily="34" charset="-34"/>
+              </a:rPr>
+              <a:t>บี ฟิต</a:t>
+            </a:r>
+            <a:r>
+              <a:rPr lang="th-TH" b="1" dirty="0" err="1">
+                <a:latin typeface="TH Sarabun New" pitchFamily="34" charset="-34"/>
+                <a:cs typeface="TH Sarabun New" pitchFamily="34" charset="-34"/>
+              </a:rPr>
+              <a:t>เนสเซ็นเตอร์</a:t>
+            </a:r>
+            <a:r>
+              <a:rPr lang="th-TH" b="1" dirty="0">
+                <a:latin typeface="TH Sarabun New" pitchFamily="34" charset="-34"/>
+                <a:cs typeface="TH Sarabun New" pitchFamily="34" charset="-34"/>
+              </a:rPr>
+              <a:t> </a:t>
+            </a:r>
+            <a:r>
+              <a:rPr lang="th-TH" dirty="0">
+                <a:latin typeface="TH Sarabun New" pitchFamily="34" charset="-34"/>
+                <a:cs typeface="TH Sarabun New" pitchFamily="34" charset="-34"/>
+              </a:rPr>
+              <a:t>ศูนย์บริการออกกำลังกายขนาดกลาง ตั้งอยู่ ณ ศูนย์การค้าเกต</a:t>
+            </a:r>
+            <a:r>
+              <a:rPr lang="th-TH" dirty="0" err="1">
+                <a:latin typeface="TH Sarabun New" pitchFamily="34" charset="-34"/>
+                <a:cs typeface="TH Sarabun New" pitchFamily="34" charset="-34"/>
+              </a:rPr>
+              <a:t>เวย์</a:t>
+            </a:r>
+            <a:r>
+              <a:rPr lang="th-TH" dirty="0">
+                <a:latin typeface="TH Sarabun New" pitchFamily="34" charset="-34"/>
+                <a:cs typeface="TH Sarabun New" pitchFamily="34" charset="-34"/>
+              </a:rPr>
+              <a:t> เอกมัย เปิดให้บริการเพียงสาขา</a:t>
+            </a:r>
+            <a:r>
+              <a:rPr lang="th-TH" dirty="0" smtClean="0">
+                <a:latin typeface="TH Sarabun New" pitchFamily="34" charset="-34"/>
+                <a:cs typeface="TH Sarabun New" pitchFamily="34" charset="-34"/>
+              </a:rPr>
+              <a:t>เดียว </a:t>
+            </a:r>
+            <a:r>
+              <a:rPr lang="th-TH" dirty="0">
+                <a:latin typeface="TH Sarabun New" pitchFamily="34" charset="-34"/>
+                <a:cs typeface="TH Sarabun New" pitchFamily="34" charset="-34"/>
+              </a:rPr>
+              <a:t>ให้บริการสำหรับการออกกำลังกายประเภทต่างๆ ได้แก่ พื้นที่สำหรับ</a:t>
+            </a:r>
+            <a:r>
+              <a:rPr lang="th-TH" dirty="0" err="1">
+                <a:latin typeface="TH Sarabun New" pitchFamily="34" charset="-34"/>
+                <a:cs typeface="TH Sarabun New" pitchFamily="34" charset="-34"/>
+              </a:rPr>
+              <a:t>คาร์ดิ</a:t>
+            </a:r>
+            <a:r>
+              <a:rPr lang="th-TH" dirty="0">
+                <a:latin typeface="TH Sarabun New" pitchFamily="34" charset="-34"/>
+                <a:cs typeface="TH Sarabun New" pitchFamily="34" charset="-34"/>
+              </a:rPr>
+              <a:t>โอ </a:t>
+            </a:r>
+            <a:r>
+              <a:rPr lang="en-US" dirty="0">
+                <a:latin typeface="TH Sarabun New" pitchFamily="34" charset="-34"/>
+                <a:cs typeface="TH Sarabun New" pitchFamily="34" charset="-34"/>
+              </a:rPr>
+              <a:t>(Cardio) </a:t>
+            </a:r>
+            <a:r>
+              <a:rPr lang="th-TH" dirty="0">
+                <a:latin typeface="TH Sarabun New" pitchFamily="34" charset="-34"/>
+                <a:cs typeface="TH Sarabun New" pitchFamily="34" charset="-34"/>
+              </a:rPr>
+              <a:t>พื้นที่สำหรับเพาะกาย (</a:t>
+            </a:r>
+            <a:r>
+              <a:rPr lang="en-US" dirty="0">
+                <a:latin typeface="TH Sarabun New" pitchFamily="34" charset="-34"/>
+                <a:cs typeface="TH Sarabun New" pitchFamily="34" charset="-34"/>
+              </a:rPr>
+              <a:t>Weight training) </a:t>
+            </a:r>
+            <a:r>
+              <a:rPr lang="th-TH" dirty="0">
+                <a:latin typeface="TH Sarabun New" pitchFamily="34" charset="-34"/>
+                <a:cs typeface="TH Sarabun New" pitchFamily="34" charset="-34"/>
+              </a:rPr>
+              <a:t>ห้องสำหรับปั่นจักรยานในร่ม (</a:t>
+            </a:r>
+            <a:r>
+              <a:rPr lang="en-US" dirty="0">
+                <a:latin typeface="TH Sarabun New" pitchFamily="34" charset="-34"/>
+                <a:cs typeface="TH Sarabun New" pitchFamily="34" charset="-34"/>
+              </a:rPr>
+              <a:t>Cycling)  </a:t>
+            </a:r>
+            <a:r>
+              <a:rPr lang="th-TH" dirty="0">
+                <a:latin typeface="TH Sarabun New" pitchFamily="34" charset="-34"/>
+                <a:cs typeface="TH Sarabun New" pitchFamily="34" charset="-34"/>
+              </a:rPr>
+              <a:t>และห้องสำหรับกิจกรรมแอโร</a:t>
+            </a:r>
+            <a:r>
+              <a:rPr lang="th-TH" dirty="0" err="1">
+                <a:latin typeface="TH Sarabun New" pitchFamily="34" charset="-34"/>
+                <a:cs typeface="TH Sarabun New" pitchFamily="34" charset="-34"/>
+              </a:rPr>
+              <a:t>บิค</a:t>
+            </a:r>
+            <a:r>
+              <a:rPr lang="th-TH" dirty="0">
+                <a:latin typeface="TH Sarabun New" pitchFamily="34" charset="-34"/>
+                <a:cs typeface="TH Sarabun New" pitchFamily="34" charset="-34"/>
+              </a:rPr>
+              <a:t> </a:t>
+            </a:r>
+            <a:r>
+              <a:rPr lang="en-US" dirty="0">
+                <a:latin typeface="TH Sarabun New" pitchFamily="34" charset="-34"/>
+                <a:cs typeface="TH Sarabun New" pitchFamily="34" charset="-34"/>
+              </a:rPr>
+              <a:t>(Aerobic)</a:t>
+            </a:r>
+            <a:endParaRPr lang="th-TH" dirty="0">
+              <a:latin typeface="TH Sarabun New" pitchFamily="34" charset="-34"/>
+              <a:cs typeface="TH Sarabun New" pitchFamily="34" charset="-34"/>
+            </a:endParaRPr>
           </a:p>
         </p:txBody>
       </p:sp>
@@ -10346,6 +11833,13 @@
   <p:clrMapOvr>
     <a:masterClrMapping/>
   </p:clrMapOvr>
+  <p:timing>
+    <p:tnLst>
+      <p:par>
+        <p:cTn id="1" dur="indefinite" restart="never" nodeType="tmRoot"/>
+      </p:par>
+    </p:tnLst>
+  </p:timing>
 </p:sld>
 </file>
 
@@ -10376,92 +11870,451 @@
             <p:ph type="title"/>
           </p:nvPr>
         </p:nvSpPr>
+        <p:spPr/>
+        <p:txBody>
+          <a:bodyPr>
+            <a:normAutofit/>
+          </a:bodyPr>
+          <a:lstStyle/>
+          <a:p>
+            <a:pPr algn="l"/>
+            <a:r>
+              <a:rPr lang="th-TH" sz="4000" b="1" dirty="0" smtClean="0">
+                <a:latin typeface="TH Sarabun New" pitchFamily="34" charset="-34"/>
+                <a:cs typeface="TH Sarabun New" pitchFamily="34" charset="-34"/>
+              </a:rPr>
+              <a:t>โครงสร้างองค์กรปัจจุบัน</a:t>
+            </a:r>
+            <a:endParaRPr lang="th-TH" sz="4000" b="1" dirty="0">
+              <a:latin typeface="TH Sarabun New" pitchFamily="34" charset="-34"/>
+              <a:cs typeface="TH Sarabun New" pitchFamily="34" charset="-34"/>
+            </a:endParaRPr>
+          </a:p>
+        </p:txBody>
+      </p:sp>
+      <p:sp>
+        <p:nvSpPr>
+          <p:cNvPr id="11" name="Content Placeholder 10"/>
+          <p:cNvSpPr>
+            <a:spLocks noGrp="1"/>
+          </p:cNvSpPr>
+          <p:nvPr>
+            <p:ph idx="1"/>
+          </p:nvPr>
+        </p:nvSpPr>
+        <p:spPr/>
+        <p:txBody>
+          <a:bodyPr/>
+          <a:lstStyle/>
+          <a:p>
+            <a:pPr marL="0" indent="0">
+              <a:buNone/>
+            </a:pPr>
+            <a:endParaRPr lang="th-TH" dirty="0"/>
+          </a:p>
+        </p:txBody>
+      </p:sp>
+      <p:sp>
+        <p:nvSpPr>
+          <p:cNvPr id="5" name="TextBox 4"/>
+          <p:cNvSpPr txBox="1"/>
+          <p:nvPr/>
+        </p:nvSpPr>
         <p:spPr>
           <a:xfrm>
-            <a:off x="323528" y="0"/>
-            <a:ext cx="8229600" cy="1600200"/>
-          </a:xfrm>
-        </p:spPr>
-        <p:txBody>
-          <a:bodyPr/>
+            <a:off x="3500115" y="2743200"/>
+            <a:ext cx="2205360" cy="1947565"/>
+          </a:xfrm>
+          <a:prstGeom prst="flowChartConnector">
+            <a:avLst/>
+          </a:prstGeom>
+        </p:spPr>
+        <p:style>
+          <a:lnRef idx="3">
+            <a:schemeClr val="lt1"/>
+          </a:lnRef>
+          <a:fillRef idx="1">
+            <a:schemeClr val="accent1"/>
+          </a:fillRef>
+          <a:effectRef idx="1">
+            <a:schemeClr val="accent1"/>
+          </a:effectRef>
+          <a:fontRef idx="minor">
+            <a:schemeClr val="lt1"/>
+          </a:fontRef>
+        </p:style>
+        <p:txBody>
+          <a:bodyPr wrap="square" rtlCol="0">
+            <a:spAutoFit/>
+          </a:bodyPr>
           <a:lstStyle/>
           <a:p>
-            <a:pPr algn="l"/>
-            <a:r>
-              <a:rPr lang="th-TH" dirty="0" smtClean="0"/>
-              <a:t>โครงสร้างองค์กรปัจจุบัน</a:t>
-            </a:r>
-            <a:endParaRPr lang="th-TH" dirty="0"/>
+            <a:pPr algn="ctr"/>
+            <a:r>
+              <a:rPr lang="en-US" sz="2800" b="1" dirty="0" smtClean="0"/>
+              <a:t>Triple B Fitness Center</a:t>
+            </a:r>
+            <a:endParaRPr lang="th-TH" sz="2800" b="1" dirty="0"/>
           </a:p>
         </p:txBody>
       </p:sp>
       <p:pic>
         <p:nvPicPr>
-          <p:cNvPr id="4" name="Content Placeholder 3"/>
+          <p:cNvPr id="2052" name="Picture 4" descr="C:\Users\parichat_k\Pictures\administrative-assistant-clip-art-74422.jpg"/>
           <p:cNvPicPr>
-            <a:picLocks noGrp="1"/>
+            <a:picLocks noChangeAspect="1" noChangeArrowheads="1"/>
           </p:cNvPicPr>
-          <p:nvPr>
-            <p:ph idx="1"/>
-          </p:nvPr>
+          <p:nvPr/>
         </p:nvPicPr>
         <p:blipFill>
-          <a:blip r:embed="rId2" cstate="print">
+          <a:blip r:embed="rId2">
             <a:extLst>
               <a:ext uri="{28A0092B-C50C-407E-A947-70E740481C1C}">
                 <a14:useLocalDpi xmlns:a14="http://schemas.microsoft.com/office/drawing/2010/main" val="0"/>
               </a:ext>
             </a:extLst>
           </a:blip>
+          <a:srcRect/>
           <a:stretch>
             <a:fillRect/>
           </a:stretch>
         </p:blipFill>
-        <p:spPr>
+        <p:spPr bwMode="auto">
           <a:xfrm>
-            <a:off x="2771453" y="2047597"/>
-            <a:ext cx="5781675" cy="3495675"/>
-          </a:xfrm>
-          <a:prstGeom prst="rect">
-            <a:avLst/>
-          </a:prstGeom>
-          <a:ln>
-            <a:solidFill>
-              <a:schemeClr val="bg1"/>
-            </a:solidFill>
-          </a:ln>
-        </p:spPr>
-      </p:pic>
-      <p:sp>
-        <p:nvSpPr>
-          <p:cNvPr id="3" name="TextBox 2"/>
-          <p:cNvSpPr txBox="1"/>
-          <p:nvPr/>
-        </p:nvSpPr>
-        <p:spPr>
-          <a:xfrm>
-            <a:off x="4099091" y="5767807"/>
-            <a:ext cx="2786340" cy="523220"/>
+            <a:off x="6473059" y="1726346"/>
+            <a:ext cx="2213741" cy="1373080"/>
           </a:xfrm>
           <a:prstGeom prst="rect">
             <a:avLst/>
           </a:prstGeom>
           <a:noFill/>
-        </p:spPr>
-        <p:txBody>
-          <a:bodyPr wrap="none" rtlCol="0">
-            <a:spAutoFit/>
-          </a:bodyPr>
+          <a:extLst>
+            <a:ext uri="{909E8E84-426E-40DD-AFC4-6F175D3DCCD1}">
+              <a14:hiddenFill xmlns:a14="http://schemas.microsoft.com/office/drawing/2010/main">
+                <a:solidFill>
+                  <a:srgbClr val="FFFFFF"/>
+                </a:solidFill>
+              </a14:hiddenFill>
+            </a:ext>
+          </a:extLst>
+        </p:spPr>
+      </p:pic>
+      <p:pic>
+        <p:nvPicPr>
+          <p:cNvPr id="2051" name="Picture 3" descr="C:\Users\parichat_k\Pictures\battering-clipart-dollar.jpg"/>
+          <p:cNvPicPr>
+            <a:picLocks noChangeAspect="1" noChangeArrowheads="1"/>
+          </p:cNvPicPr>
+          <p:nvPr/>
+        </p:nvPicPr>
+        <p:blipFill>
+          <a:blip r:embed="rId3">
+            <a:extLst>
+              <a:ext uri="{28A0092B-C50C-407E-A947-70E740481C1C}">
+                <a14:useLocalDpi xmlns:a14="http://schemas.microsoft.com/office/drawing/2010/main" val="0"/>
+              </a:ext>
+            </a:extLst>
+          </a:blip>
+          <a:srcRect/>
+          <a:stretch>
+            <a:fillRect/>
+          </a:stretch>
+        </p:blipFill>
+        <p:spPr bwMode="auto">
+          <a:xfrm>
+            <a:off x="7472018" y="1726346"/>
+            <a:ext cx="215822" cy="303312"/>
+          </a:xfrm>
+          <a:prstGeom prst="rect">
+            <a:avLst/>
+          </a:prstGeom>
+          <a:noFill/>
+          <a:extLst>
+            <a:ext uri="{909E8E84-426E-40DD-AFC4-6F175D3DCCD1}">
+              <a14:hiddenFill xmlns:a14="http://schemas.microsoft.com/office/drawing/2010/main">
+                <a:solidFill>
+                  <a:srgbClr val="FFFFFF"/>
+                </a:solidFill>
+              </a14:hiddenFill>
+            </a:ext>
+          </a:extLst>
+        </p:spPr>
+      </p:pic>
+      <p:sp>
+        <p:nvSpPr>
+          <p:cNvPr id="6" name="Down Arrow 5"/>
+          <p:cNvSpPr/>
+          <p:nvPr/>
+        </p:nvSpPr>
+        <p:spPr>
+          <a:xfrm rot="3543424">
+            <a:off x="5897460" y="2350067"/>
+            <a:ext cx="542925" cy="1085850"/>
+          </a:xfrm>
+          <a:prstGeom prst="downArrow">
+            <a:avLst/>
+          </a:prstGeom>
+        </p:spPr>
+        <p:style>
+          <a:lnRef idx="1">
+            <a:schemeClr val="accent1"/>
+          </a:lnRef>
+          <a:fillRef idx="3">
+            <a:schemeClr val="accent1"/>
+          </a:fillRef>
+          <a:effectRef idx="2">
+            <a:schemeClr val="accent1"/>
+          </a:effectRef>
+          <a:fontRef idx="minor">
+            <a:schemeClr val="lt1"/>
+          </a:fontRef>
+        </p:style>
+        <p:txBody>
+          <a:bodyPr rtlCol="0" anchor="ctr"/>
           <a:lstStyle/>
           <a:p>
-            <a:r>
-              <a:rPr lang="th-TH" sz="2800" b="1" dirty="0" smtClean="0"/>
-              <a:t>โครงสร้างองค์กรปัจจุบัน</a:t>
-            </a:r>
-            <a:endParaRPr lang="th-TH" sz="2800" b="1" dirty="0"/>
-          </a:p>
-        </p:txBody>
-      </p:sp>
+            <a:pPr algn="ctr"/>
+            <a:endParaRPr lang="th-TH"/>
+          </a:p>
+        </p:txBody>
+      </p:sp>
+      <p:pic>
+        <p:nvPicPr>
+          <p:cNvPr id="2053" name="Picture 5" descr="C:\Users\parichat_k\Pictures\personal-trainer-clip-art-103857.gif"/>
+          <p:cNvPicPr>
+            <a:picLocks noChangeAspect="1" noChangeArrowheads="1"/>
+          </p:cNvPicPr>
+          <p:nvPr/>
+        </p:nvPicPr>
+        <p:blipFill>
+          <a:blip r:embed="rId4">
+            <a:extLst>
+              <a:ext uri="{28A0092B-C50C-407E-A947-70E740481C1C}">
+                <a14:useLocalDpi xmlns:a14="http://schemas.microsoft.com/office/drawing/2010/main" val="0"/>
+              </a:ext>
+            </a:extLst>
+          </a:blip>
+          <a:srcRect/>
+          <a:stretch>
+            <a:fillRect/>
+          </a:stretch>
+        </p:blipFill>
+        <p:spPr bwMode="auto">
+          <a:xfrm>
+            <a:off x="1120569" y="4215745"/>
+            <a:ext cx="1518925" cy="1729714"/>
+          </a:xfrm>
+          <a:prstGeom prst="rect">
+            <a:avLst/>
+          </a:prstGeom>
+          <a:noFill/>
+          <a:extLst>
+            <a:ext uri="{909E8E84-426E-40DD-AFC4-6F175D3DCCD1}">
+              <a14:hiddenFill xmlns:a14="http://schemas.microsoft.com/office/drawing/2010/main">
+                <a:solidFill>
+                  <a:srgbClr val="FFFFFF"/>
+                </a:solidFill>
+              </a14:hiddenFill>
+            </a:ext>
+          </a:extLst>
+        </p:spPr>
+      </p:pic>
+      <p:sp>
+        <p:nvSpPr>
+          <p:cNvPr id="9" name="Down Arrow 8"/>
+          <p:cNvSpPr/>
+          <p:nvPr/>
+        </p:nvSpPr>
+        <p:spPr>
+          <a:xfrm rot="13550258">
+            <a:off x="2799281" y="4240810"/>
+            <a:ext cx="542925" cy="1085850"/>
+          </a:xfrm>
+          <a:prstGeom prst="downArrow">
+            <a:avLst/>
+          </a:prstGeom>
+        </p:spPr>
+        <p:style>
+          <a:lnRef idx="1">
+            <a:schemeClr val="accent1"/>
+          </a:lnRef>
+          <a:fillRef idx="3">
+            <a:schemeClr val="accent1"/>
+          </a:fillRef>
+          <a:effectRef idx="2">
+            <a:schemeClr val="accent1"/>
+          </a:effectRef>
+          <a:fontRef idx="minor">
+            <a:schemeClr val="lt1"/>
+          </a:fontRef>
+        </p:style>
+        <p:txBody>
+          <a:bodyPr rtlCol="0" anchor="ctr"/>
+          <a:lstStyle/>
+          <a:p>
+            <a:pPr algn="ctr"/>
+            <a:endParaRPr lang="th-TH"/>
+          </a:p>
+        </p:txBody>
+      </p:sp>
+      <p:pic>
+        <p:nvPicPr>
+          <p:cNvPr id="2054" name="Picture 6" descr="C:\Users\parichat_k\Pictures\Customer-Service-clip-art.jpg"/>
+          <p:cNvPicPr>
+            <a:picLocks noChangeAspect="1" noChangeArrowheads="1"/>
+          </p:cNvPicPr>
+          <p:nvPr/>
+        </p:nvPicPr>
+        <p:blipFill>
+          <a:blip r:embed="rId5">
+            <a:extLst>
+              <a:ext uri="{28A0092B-C50C-407E-A947-70E740481C1C}">
+                <a14:useLocalDpi xmlns:a14="http://schemas.microsoft.com/office/drawing/2010/main" val="0"/>
+              </a:ext>
+            </a:extLst>
+          </a:blip>
+          <a:srcRect/>
+          <a:stretch>
+            <a:fillRect/>
+          </a:stretch>
+        </p:blipFill>
+        <p:spPr bwMode="auto">
+          <a:xfrm>
+            <a:off x="6628383" y="4365274"/>
+            <a:ext cx="2118913" cy="1610374"/>
+          </a:xfrm>
+          <a:prstGeom prst="rect">
+            <a:avLst/>
+          </a:prstGeom>
+          <a:noFill/>
+          <a:extLst>
+            <a:ext uri="{909E8E84-426E-40DD-AFC4-6F175D3DCCD1}">
+              <a14:hiddenFill xmlns:a14="http://schemas.microsoft.com/office/drawing/2010/main">
+                <a:solidFill>
+                  <a:srgbClr val="FFFFFF"/>
+                </a:solidFill>
+              </a14:hiddenFill>
+            </a:ext>
+          </a:extLst>
+        </p:spPr>
+      </p:pic>
+      <p:sp>
+        <p:nvSpPr>
+          <p:cNvPr id="7" name="Down Arrow 6"/>
+          <p:cNvSpPr/>
+          <p:nvPr/>
+        </p:nvSpPr>
+        <p:spPr>
+          <a:xfrm rot="7981815">
+            <a:off x="5874339" y="4222155"/>
+            <a:ext cx="542925" cy="1085850"/>
+          </a:xfrm>
+          <a:prstGeom prst="downArrow">
+            <a:avLst/>
+          </a:prstGeom>
+        </p:spPr>
+        <p:style>
+          <a:lnRef idx="1">
+            <a:schemeClr val="accent1"/>
+          </a:lnRef>
+          <a:fillRef idx="3">
+            <a:schemeClr val="accent1"/>
+          </a:fillRef>
+          <a:effectRef idx="2">
+            <a:schemeClr val="accent1"/>
+          </a:effectRef>
+          <a:fontRef idx="minor">
+            <a:schemeClr val="lt1"/>
+          </a:fontRef>
+        </p:style>
+        <p:txBody>
+          <a:bodyPr rtlCol="0" anchor="ctr"/>
+          <a:lstStyle/>
+          <a:p>
+            <a:pPr algn="ctr"/>
+            <a:endParaRPr lang="th-TH"/>
+          </a:p>
+        </p:txBody>
+      </p:sp>
+      <p:sp>
+        <p:nvSpPr>
+          <p:cNvPr id="8" name="Down Arrow 7"/>
+          <p:cNvSpPr/>
+          <p:nvPr/>
+        </p:nvSpPr>
+        <p:spPr>
+          <a:xfrm rot="17663430">
+            <a:off x="2657760" y="2309513"/>
+            <a:ext cx="542925" cy="1085850"/>
+          </a:xfrm>
+          <a:prstGeom prst="downArrow">
+            <a:avLst/>
+          </a:prstGeom>
+        </p:spPr>
+        <p:style>
+          <a:lnRef idx="1">
+            <a:schemeClr val="accent1"/>
+          </a:lnRef>
+          <a:fillRef idx="3">
+            <a:schemeClr val="accent1"/>
+          </a:fillRef>
+          <a:effectRef idx="2">
+            <a:schemeClr val="accent1"/>
+          </a:effectRef>
+          <a:fontRef idx="minor">
+            <a:schemeClr val="lt1"/>
+          </a:fontRef>
+        </p:style>
+        <p:txBody>
+          <a:bodyPr rtlCol="0" anchor="ctr"/>
+          <a:lstStyle/>
+          <a:p>
+            <a:pPr algn="ctr"/>
+            <a:endParaRPr lang="th-TH"/>
+          </a:p>
+        </p:txBody>
+      </p:sp>
+      <p:pic>
+        <p:nvPicPr>
+          <p:cNvPr id="2050" name="Picture 2" descr="C:\Users\parichat_k\Pictures\teachers-desk-clip-art-545884.png"/>
+          <p:cNvPicPr>
+            <a:picLocks noChangeAspect="1" noChangeArrowheads="1"/>
+          </p:cNvPicPr>
+          <p:nvPr/>
+        </p:nvPicPr>
+        <p:blipFill>
+          <a:blip r:embed="rId6">
+            <a:extLst>
+              <a:ext uri="{28A0092B-C50C-407E-A947-70E740481C1C}">
+                <a14:useLocalDpi xmlns:a14="http://schemas.microsoft.com/office/drawing/2010/main" val="0"/>
+              </a:ext>
+            </a:extLst>
+          </a:blip>
+          <a:srcRect/>
+          <a:stretch>
+            <a:fillRect/>
+          </a:stretch>
+        </p:blipFill>
+        <p:spPr bwMode="auto">
+          <a:xfrm>
+            <a:off x="856008" y="1392124"/>
+            <a:ext cx="1783486" cy="1599064"/>
+          </a:xfrm>
+          <a:prstGeom prst="rect">
+            <a:avLst/>
+          </a:prstGeom>
+          <a:noFill/>
+          <a:extLst>
+            <a:ext uri="{909E8E84-426E-40DD-AFC4-6F175D3DCCD1}">
+              <a14:hiddenFill xmlns:a14="http://schemas.microsoft.com/office/drawing/2010/main">
+                <a:solidFill>
+                  <a:srgbClr val="FFFFFF"/>
+                </a:solidFill>
+              </a14:hiddenFill>
+            </a:ext>
+          </a:extLst>
+        </p:spPr>
+      </p:pic>
     </p:spTree>
     <p:extLst>
       <p:ext uri="{BB962C8B-B14F-4D97-AF65-F5344CB8AC3E}">
@@ -10472,6 +12325,18 @@
   <p:clrMapOvr>
     <a:masterClrMapping/>
   </p:clrMapOvr>
+  <mc:AlternateContent xmlns:mc="http://schemas.openxmlformats.org/markup-compatibility/2006">
+    <mc:Choice xmlns:p14="http://schemas.microsoft.com/office/powerpoint/2010/main" Requires="p14">
+      <p:transition spd="slow" p14:dur="1500">
+        <p:split orient="vert"/>
+      </p:transition>
+    </mc:Choice>
+    <mc:Fallback>
+      <p:transition spd="slow">
+        <p:split orient="vert"/>
+      </p:transition>
+    </mc:Fallback>
+  </mc:AlternateContent>
   <p:timing>
     <p:tnLst>
       <p:par>
@@ -10511,14 +12376,22 @@
         </p:nvSpPr>
         <p:spPr/>
         <p:txBody>
-          <a:bodyPr/>
+          <a:bodyPr>
+            <a:normAutofit/>
+          </a:bodyPr>
           <a:lstStyle/>
           <a:p>
             <a:r>
-              <a:rPr lang="th-TH" dirty="0" smtClean="0"/>
+              <a:rPr lang="th-TH" sz="4000" b="1" dirty="0" smtClean="0">
+                <a:latin typeface="TH Sarabun New" pitchFamily="34" charset="-34"/>
+                <a:cs typeface="TH Sarabun New" pitchFamily="34" charset="-34"/>
+              </a:rPr>
               <a:t>ปัญหาของระบบปัจจุบัน</a:t>
             </a:r>
-            <a:endParaRPr lang="th-TH" dirty="0"/>
+            <a:endParaRPr lang="th-TH" sz="4000" b="1" dirty="0">
+              <a:latin typeface="TH Sarabun New" pitchFamily="34" charset="-34"/>
+              <a:cs typeface="TH Sarabun New" pitchFamily="34" charset="-34"/>
+            </a:endParaRPr>
           </a:p>
         </p:txBody>
       </p:sp>
@@ -10532,37 +12405,80 @@
             <p:ph idx="1"/>
           </p:nvPr>
         </p:nvSpPr>
-        <p:spPr/>
-        <p:txBody>
-          <a:bodyPr/>
+        <p:spPr>
+          <a:xfrm>
+            <a:off x="457200" y="1568303"/>
+            <a:ext cx="8229600" cy="2642191"/>
+          </a:xfrm>
+        </p:spPr>
+        <p:txBody>
+          <a:bodyPr>
+            <a:normAutofit/>
+          </a:bodyPr>
           <a:lstStyle/>
           <a:p>
             <a:r>
-              <a:rPr lang="th-TH" dirty="0" smtClean="0"/>
-              <a:t>การจัดเก็บข้อมูลของสมาชิก</a:t>
-            </a:r>
-          </a:p>
-          <a:p>
-            <a:r>
-              <a:rPr lang="th-TH" dirty="0" smtClean="0"/>
+              <a:rPr lang="th-TH" sz="3600" dirty="0" smtClean="0">
+                <a:latin typeface="TH Sarabun New" pitchFamily="34" charset="-34"/>
+                <a:cs typeface="TH Sarabun New" pitchFamily="34" charset="-34"/>
+              </a:rPr>
+              <a:t>การจัดเก็บข้อมูลของ</a:t>
+            </a:r>
+            <a:r>
+              <a:rPr lang="th-TH" sz="3600" dirty="0" smtClean="0">
+                <a:latin typeface="TH Sarabun New" pitchFamily="34" charset="-34"/>
+                <a:cs typeface="TH Sarabun New" pitchFamily="34" charset="-34"/>
+              </a:rPr>
+              <a:t>สมาชิก </a:t>
+            </a:r>
+            <a:r>
+              <a:rPr lang="en-US" sz="3600" dirty="0" smtClean="0">
+                <a:latin typeface="TH Sarabun New" pitchFamily="34" charset="-34"/>
+                <a:cs typeface="TH Sarabun New" pitchFamily="34" charset="-34"/>
+              </a:rPr>
+              <a:t>(Member)</a:t>
+            </a:r>
+            <a:endParaRPr lang="th-TH" sz="3600" dirty="0" smtClean="0">
+              <a:latin typeface="TH Sarabun New" pitchFamily="34" charset="-34"/>
+              <a:cs typeface="TH Sarabun New" pitchFamily="34" charset="-34"/>
+            </a:endParaRPr>
+          </a:p>
+          <a:p>
+            <a:r>
+              <a:rPr lang="th-TH" sz="3600" dirty="0" smtClean="0">
+                <a:latin typeface="TH Sarabun New" pitchFamily="34" charset="-34"/>
+                <a:cs typeface="TH Sarabun New" pitchFamily="34" charset="-34"/>
+              </a:rPr>
               <a:t>การจัดเก็บข้อมูลบัญชีรายรับ</a:t>
             </a:r>
           </a:p>
           <a:p>
             <a:r>
-              <a:rPr lang="th-TH" dirty="0" smtClean="0"/>
+              <a:rPr lang="th-TH" sz="3600" dirty="0" smtClean="0">
+                <a:latin typeface="TH Sarabun New" pitchFamily="34" charset="-34"/>
+                <a:cs typeface="TH Sarabun New" pitchFamily="34" charset="-34"/>
+              </a:rPr>
               <a:t>การประเมินความสามารถและค่าตอบแทนพนักงาน</a:t>
             </a:r>
-            <a:endParaRPr lang="th-TH" dirty="0"/>
-          </a:p>
-          <a:p>
-            <a:r>
-              <a:rPr lang="th-TH" dirty="0"/>
+            <a:endParaRPr lang="th-TH" sz="3600" dirty="0">
+              <a:latin typeface="TH Sarabun New" pitchFamily="34" charset="-34"/>
+              <a:cs typeface="TH Sarabun New" pitchFamily="34" charset="-34"/>
+            </a:endParaRPr>
+          </a:p>
+          <a:p>
+            <a:r>
+              <a:rPr lang="th-TH" sz="3600" dirty="0">
+                <a:latin typeface="TH Sarabun New" pitchFamily="34" charset="-34"/>
+                <a:cs typeface="TH Sarabun New" pitchFamily="34" charset="-34"/>
+              </a:rPr>
               <a:t>การจัดเก็บข้อมูลสินค้าในคลังสินค้า </a:t>
             </a:r>
           </a:p>
           <a:p>
-            <a:endParaRPr lang="th-TH" dirty="0"/>
+            <a:endParaRPr lang="th-TH" sz="3600" dirty="0">
+              <a:latin typeface="TH Sarabun New" pitchFamily="34" charset="-34"/>
+              <a:cs typeface="TH Sarabun New" pitchFamily="34" charset="-34"/>
+            </a:endParaRPr>
           </a:p>
         </p:txBody>
       </p:sp>
@@ -10576,6 +12492,13 @@
   <p:clrMapOvr>
     <a:masterClrMapping/>
   </p:clrMapOvr>
+  <p:timing>
+    <p:tnLst>
+      <p:par>
+        <p:cTn id="1" dur="indefinite" restart="never" nodeType="tmRoot"/>
+      </p:par>
+    </p:tnLst>
+  </p:timing>
 </p:sld>
 </file>
 
@@ -10598,6 +12521,48 @@
       </p:grpSpPr>
       <p:sp>
         <p:nvSpPr>
+          <p:cNvPr id="3" name="Rectangle 2"/>
+          <p:cNvSpPr/>
+          <p:nvPr/>
+        </p:nvSpPr>
+        <p:spPr>
+          <a:xfrm>
+            <a:off x="2413591" y="1520456"/>
+            <a:ext cx="6411432" cy="4476307"/>
+          </a:xfrm>
+          <a:prstGeom prst="rect">
+            <a:avLst/>
+          </a:prstGeom>
+          <a:noFill/>
+          <a:ln>
+            <a:noFill/>
+          </a:ln>
+        </p:spPr>
+        <p:style>
+          <a:lnRef idx="1">
+            <a:schemeClr val="accent3"/>
+          </a:lnRef>
+          <a:fillRef idx="2">
+            <a:schemeClr val="accent3"/>
+          </a:fillRef>
+          <a:effectRef idx="1">
+            <a:schemeClr val="accent3"/>
+          </a:effectRef>
+          <a:fontRef idx="minor">
+            <a:schemeClr val="dk1"/>
+          </a:fontRef>
+        </p:style>
+        <p:txBody>
+          <a:bodyPr rtlCol="0" anchor="ctr"/>
+          <a:lstStyle/>
+          <a:p>
+            <a:pPr algn="ctr"/>
+            <a:endParaRPr lang="th-TH"/>
+          </a:p>
+        </p:txBody>
+      </p:sp>
+      <p:sp>
+        <p:nvSpPr>
           <p:cNvPr id="2" name="ชื่อเรื่อง 1"/>
           <p:cNvSpPr>
             <a:spLocks noGrp="1"/>
@@ -10608,14 +12573,22 @@
         </p:nvSpPr>
         <p:spPr/>
         <p:txBody>
-          <a:bodyPr/>
+          <a:bodyPr>
+            <a:normAutofit/>
+          </a:bodyPr>
           <a:lstStyle/>
           <a:p>
             <a:r>
-              <a:rPr lang="th-TH" dirty="0" smtClean="0"/>
+              <a:rPr lang="th-TH" sz="4000" b="1" dirty="0" smtClean="0">
+                <a:latin typeface="TH Sarabun New" pitchFamily="34" charset="-34"/>
+                <a:cs typeface="TH Sarabun New" pitchFamily="34" charset="-34"/>
+              </a:rPr>
               <a:t>การจัดเก็บข้อมูลของสมาชิก</a:t>
             </a:r>
-            <a:endParaRPr lang="th-TH" dirty="0"/>
+            <a:endParaRPr lang="th-TH" sz="4000" b="1" dirty="0">
+              <a:latin typeface="TH Sarabun New" pitchFamily="34" charset="-34"/>
+              <a:cs typeface="TH Sarabun New" pitchFamily="34" charset="-34"/>
+            </a:endParaRPr>
           </a:p>
         </p:txBody>
       </p:sp>
@@ -10629,7 +12602,7 @@
             <p:ph idx="1"/>
           </p:nvPr>
         </p:nvPicPr>
-        <p:blipFill>
+        <p:blipFill rotWithShape="1">
           <a:blip r:embed="rId2">
             <a:extLst>
               <a:ext uri="{28A0092B-C50C-407E-A947-70E740481C1C}">
@@ -10637,15 +12610,27 @@
               </a:ext>
             </a:extLst>
           </a:blip>
-          <a:stretch>
-            <a:fillRect/>
-          </a:stretch>
+          <a:srcRect l="2648" t="1696" r="6022" b="7754"/>
+          <a:stretch/>
         </p:blipFill>
         <p:spPr>
           <a:xfrm>
-            <a:off x="2992438" y="1727796"/>
-            <a:ext cx="5694362" cy="4270771"/>
-          </a:xfrm>
+            <a:off x="3143250" y="1800225"/>
+            <a:ext cx="5200650" cy="3867150"/>
+          </a:xfrm>
+          <a:prstGeom prst="rect">
+            <a:avLst/>
+          </a:prstGeom>
+          <a:ln>
+            <a:noFill/>
+          </a:ln>
+          <a:effectLst>
+            <a:outerShdw blurRad="190500" algn="tl" rotWithShape="0">
+              <a:srgbClr val="000000">
+                <a:alpha val="70000"/>
+              </a:srgbClr>
+            </a:outerShdw>
+          </a:effectLst>
         </p:spPr>
       </p:pic>
     </p:spTree>
@@ -10658,6 +12643,13 @@
   <p:clrMapOvr>
     <a:masterClrMapping/>
   </p:clrMapOvr>
+  <p:timing>
+    <p:tnLst>
+      <p:par>
+        <p:cTn id="1" dur="indefinite" restart="never" nodeType="tmRoot"/>
+      </p:par>
+    </p:tnLst>
+  </p:timing>
 </p:sld>
 </file>
 
@@ -10688,26 +12680,31 @@
             <p:ph type="title"/>
           </p:nvPr>
         </p:nvSpPr>
-        <p:spPr>
-          <a:xfrm>
-            <a:off x="323528" y="23056"/>
-            <a:ext cx="8229600" cy="1600200"/>
-          </a:xfrm>
-        </p:spPr>
-        <p:txBody>
-          <a:bodyPr/>
+        <p:spPr/>
+        <p:txBody>
+          <a:bodyPr>
+            <a:normAutofit/>
+          </a:bodyPr>
           <a:lstStyle/>
           <a:p>
-            <a:pPr algn="l"/>
-            <a:r>
-              <a:rPr lang="th-TH" dirty="0" smtClean="0"/>
-              <a:t>	</a:t>
-            </a:r>
-            <a:r>
-              <a:rPr lang="th-TH" dirty="0" smtClean="0"/>
-              <a:t>การจัดเก็บข้อมูลบัญชีรายรับ</a:t>
-            </a:r>
-            <a:endParaRPr lang="th-TH" dirty="0"/>
+            <a:r>
+              <a:rPr lang="th-TH" sz="4000" b="1" dirty="0" smtClean="0">
+                <a:latin typeface="TH Sarabun New" pitchFamily="34" charset="-34"/>
+                <a:cs typeface="TH Sarabun New" pitchFamily="34" charset="-34"/>
+              </a:rPr>
+              <a:t>การ</a:t>
+            </a:r>
+            <a:r>
+              <a:rPr lang="th-TH" sz="4000" b="1" dirty="0" smtClean="0">
+                <a:latin typeface="TH Sarabun New" pitchFamily="34" charset="-34"/>
+                <a:cs typeface="TH Sarabun New" pitchFamily="34" charset="-34"/>
+              </a:rPr>
+              <a:t>จัดเก็บข้อมูลบัญชีรายรับ</a:t>
+            </a:r>
+            <a:endParaRPr lang="th-TH" sz="4000" b="1" dirty="0">
+              <a:latin typeface="TH Sarabun New" pitchFamily="34" charset="-34"/>
+              <a:cs typeface="TH Sarabun New" pitchFamily="34" charset="-34"/>
+            </a:endParaRPr>
           </a:p>
         </p:txBody>
       </p:sp>
@@ -10743,7 +12740,9 @@
           </a:prstGeom>
           <a:noFill/>
           <a:ln w="6350">
-            <a:noFill/>
+            <a:solidFill>
+              <a:schemeClr val="accent1"/>
+            </a:solidFill>
           </a:ln>
         </p:spPr>
       </p:pic>

</xml_diff>